<commit_message>
Updated System Requirements Document and Presentation Slideshow for Spiral 1
</commit_message>
<xml_diff>
--- a/Presentation/Spiral1.pptx
+++ b/Presentation/Spiral1.pptx
@@ -123,6 +123,11 @@
       </a:defRPr>
     </a:lvl9pPr>
   </p:defaultTextStyle>
+  <p:extLst>
+    <p:ext uri="{EFAFB233-063F-42B5-8137-9DF3F51BA10A}">
+      <p15:sldGuideLst xmlns:p15="http://schemas.microsoft.com/office/powerpoint/2012/main"/>
+    </p:ext>
+  </p:extLst>
 </p:presentation>
 </file>
 
@@ -176,7 +181,7 @@
           <a:noFill/>
           <a:extLst>
             <a:ext uri="{909E8E84-426E-40dd-AFC4-6F175D3DCCD1}">
-              <a14:hiddenFill xmlns:a14="http://schemas.microsoft.com/office/drawing/2010/main" xmlns="">
+              <a14:hiddenFill xmlns="" xmlns:a14="http://schemas.microsoft.com/office/drawing/2010/main">
                 <a:solidFill>
                   <a:srgbClr val="FFFFFF"/>
                 </a:solidFill>
@@ -236,7 +241,7 @@
             </a:ln>
             <a:extLst>
               <a:ext uri="{91240B29-F687-4f45-9708-019B960494DF}">
-                <a14:hiddenLine xmlns:a14="http://schemas.microsoft.com/office/drawing/2010/main" xmlns="" w="9525">
+                <a14:hiddenLine xmlns="" xmlns:a14="http://schemas.microsoft.com/office/drawing/2010/main" w="9525">
                   <a:solidFill>
                     <a:srgbClr val="000000"/>
                   </a:solidFill>
@@ -326,7 +331,7 @@
             </a:ln>
             <a:extLst>
               <a:ext uri="{91240B29-F687-4f45-9708-019B960494DF}">
-                <a14:hiddenLine xmlns:a14="http://schemas.microsoft.com/office/drawing/2010/main" xmlns="" w="9525">
+                <a14:hiddenLine xmlns="" xmlns:a14="http://schemas.microsoft.com/office/drawing/2010/main" w="9525">
                   <a:solidFill>
                     <a:srgbClr val="000000"/>
                   </a:solidFill>
@@ -416,7 +421,7 @@
             </a:ln>
             <a:extLst>
               <a:ext uri="{91240B29-F687-4f45-9708-019B960494DF}">
-                <a14:hiddenLine xmlns:a14="http://schemas.microsoft.com/office/drawing/2010/main" xmlns="" w="9525">
+                <a14:hiddenLine xmlns="" xmlns:a14="http://schemas.microsoft.com/office/drawing/2010/main" w="9525">
                   <a:solidFill>
                     <a:srgbClr val="000000"/>
                   </a:solidFill>
@@ -450,7 +455,7 @@
             </a:ln>
             <a:extLst>
               <a:ext uri="{91240B29-F687-4f45-9708-019B960494DF}">
-                <a14:hiddenLine xmlns:a14="http://schemas.microsoft.com/office/drawing/2010/main" xmlns="" w="9525">
+                <a14:hiddenLine xmlns="" xmlns:a14="http://schemas.microsoft.com/office/drawing/2010/main" w="9525">
                   <a:solidFill>
                     <a:srgbClr val="000000"/>
                   </a:solidFill>
@@ -540,7 +545,7 @@
             </a:ln>
             <a:extLst>
               <a:ext uri="{91240B29-F687-4f45-9708-019B960494DF}">
-                <a14:hiddenLine xmlns:a14="http://schemas.microsoft.com/office/drawing/2010/main" xmlns="" w="9525">
+                <a14:hiddenLine xmlns="" xmlns:a14="http://schemas.microsoft.com/office/drawing/2010/main" w="9525">
                   <a:solidFill>
                     <a:srgbClr val="000000"/>
                   </a:solidFill>
@@ -602,7 +607,7 @@
             </a:ln>
             <a:extLst>
               <a:ext uri="{91240B29-F687-4f45-9708-019B960494DF}">
-                <a14:hiddenLine xmlns:a14="http://schemas.microsoft.com/office/drawing/2010/main" xmlns="" w="9525">
+                <a14:hiddenLine xmlns="" xmlns:a14="http://schemas.microsoft.com/office/drawing/2010/main" w="9525">
                   <a:solidFill>
                     <a:srgbClr val="000000"/>
                   </a:solidFill>
@@ -664,7 +669,7 @@
             </a:ln>
             <a:extLst>
               <a:ext uri="{91240B29-F687-4f45-9708-019B960494DF}">
-                <a14:hiddenLine xmlns:a14="http://schemas.microsoft.com/office/drawing/2010/main" xmlns="" w="9525">
+                <a14:hiddenLine xmlns="" xmlns:a14="http://schemas.microsoft.com/office/drawing/2010/main" w="9525">
                   <a:solidFill>
                     <a:srgbClr val="000000"/>
                   </a:solidFill>
@@ -754,7 +759,7 @@
             </a:ln>
             <a:extLst>
               <a:ext uri="{91240B29-F687-4f45-9708-019B960494DF}">
-                <a14:hiddenLine xmlns:a14="http://schemas.microsoft.com/office/drawing/2010/main" xmlns="" w="9525">
+                <a14:hiddenLine xmlns="" xmlns:a14="http://schemas.microsoft.com/office/drawing/2010/main" w="9525">
                   <a:solidFill>
                     <a:srgbClr val="000000"/>
                   </a:solidFill>
@@ -816,7 +821,7 @@
             </a:ln>
             <a:extLst>
               <a:ext uri="{91240B29-F687-4f45-9708-019B960494DF}">
-                <a14:hiddenLine xmlns:a14="http://schemas.microsoft.com/office/drawing/2010/main" xmlns="" w="9525">
+                <a14:hiddenLine xmlns="" xmlns:a14="http://schemas.microsoft.com/office/drawing/2010/main" w="9525">
                   <a:solidFill>
                     <a:srgbClr val="000000"/>
                   </a:solidFill>
@@ -878,7 +883,7 @@
             </a:ln>
             <a:extLst>
               <a:ext uri="{91240B29-F687-4f45-9708-019B960494DF}">
-                <a14:hiddenLine xmlns:a14="http://schemas.microsoft.com/office/drawing/2010/main" xmlns="" w="9525">
+                <a14:hiddenLine xmlns="" xmlns:a14="http://schemas.microsoft.com/office/drawing/2010/main" w="9525">
                   <a:solidFill>
                     <a:srgbClr val="000000"/>
                   </a:solidFill>
@@ -968,7 +973,7 @@
             </a:ln>
             <a:extLst>
               <a:ext uri="{91240B29-F687-4f45-9708-019B960494DF}">
-                <a14:hiddenLine xmlns:a14="http://schemas.microsoft.com/office/drawing/2010/main" xmlns="" w="9525">
+                <a14:hiddenLine xmlns="" xmlns:a14="http://schemas.microsoft.com/office/drawing/2010/main" w="9525">
                   <a:solidFill>
                     <a:srgbClr val="000000"/>
                   </a:solidFill>
@@ -1058,7 +1063,7 @@
             </a:ln>
             <a:extLst>
               <a:ext uri="{91240B29-F687-4f45-9708-019B960494DF}">
-                <a14:hiddenLine xmlns:a14="http://schemas.microsoft.com/office/drawing/2010/main" xmlns="" w="9525">
+                <a14:hiddenLine xmlns="" xmlns:a14="http://schemas.microsoft.com/office/drawing/2010/main" w="9525">
                   <a:solidFill>
                     <a:srgbClr val="000000"/>
                   </a:solidFill>
@@ -1120,7 +1125,7 @@
             </a:ln>
             <a:extLst>
               <a:ext uri="{91240B29-F687-4f45-9708-019B960494DF}">
-                <a14:hiddenLine xmlns:a14="http://schemas.microsoft.com/office/drawing/2010/main" xmlns="" w="9525">
+                <a14:hiddenLine xmlns="" xmlns:a14="http://schemas.microsoft.com/office/drawing/2010/main" w="9525">
                   <a:solidFill>
                     <a:srgbClr val="000000"/>
                   </a:solidFill>
@@ -1230,7 +1235,7 @@
             </a:ln>
             <a:extLst>
               <a:ext uri="{91240B29-F687-4f45-9708-019B960494DF}">
-                <a14:hiddenLine xmlns:a14="http://schemas.microsoft.com/office/drawing/2010/main" xmlns="" w="9525">
+                <a14:hiddenLine xmlns="" xmlns:a14="http://schemas.microsoft.com/office/drawing/2010/main" w="9525">
                   <a:solidFill>
                     <a:srgbClr val="000000"/>
                   </a:solidFill>
@@ -1292,7 +1297,7 @@
             </a:ln>
             <a:extLst>
               <a:ext uri="{91240B29-F687-4f45-9708-019B960494DF}">
-                <a14:hiddenLine xmlns:a14="http://schemas.microsoft.com/office/drawing/2010/main" xmlns="" w="9525">
+                <a14:hiddenLine xmlns="" xmlns:a14="http://schemas.microsoft.com/office/drawing/2010/main" w="9525">
                   <a:solidFill>
                     <a:srgbClr val="000000"/>
                   </a:solidFill>
@@ -1382,7 +1387,7 @@
             </a:ln>
             <a:extLst>
               <a:ext uri="{91240B29-F687-4f45-9708-019B960494DF}">
-                <a14:hiddenLine xmlns:a14="http://schemas.microsoft.com/office/drawing/2010/main" xmlns="" w="9525">
+                <a14:hiddenLine xmlns="" xmlns:a14="http://schemas.microsoft.com/office/drawing/2010/main" w="9525">
                   <a:solidFill>
                     <a:srgbClr val="000000"/>
                   </a:solidFill>
@@ -1472,7 +1477,7 @@
             </a:ln>
             <a:extLst>
               <a:ext uri="{91240B29-F687-4f45-9708-019B960494DF}">
-                <a14:hiddenLine xmlns:a14="http://schemas.microsoft.com/office/drawing/2010/main" xmlns="" w="9525">
+                <a14:hiddenLine xmlns="" xmlns:a14="http://schemas.microsoft.com/office/drawing/2010/main" w="9525">
                   <a:solidFill>
                     <a:srgbClr val="000000"/>
                   </a:solidFill>
@@ -1534,7 +1539,7 @@
             </a:ln>
             <a:extLst>
               <a:ext uri="{91240B29-F687-4f45-9708-019B960494DF}">
-                <a14:hiddenLine xmlns:a14="http://schemas.microsoft.com/office/drawing/2010/main" xmlns="" w="9525">
+                <a14:hiddenLine xmlns="" xmlns:a14="http://schemas.microsoft.com/office/drawing/2010/main" w="9525">
                   <a:solidFill>
                     <a:srgbClr val="000000"/>
                   </a:solidFill>
@@ -1624,7 +1629,7 @@
             </a:ln>
             <a:extLst>
               <a:ext uri="{91240B29-F687-4f45-9708-019B960494DF}">
-                <a14:hiddenLine xmlns:a14="http://schemas.microsoft.com/office/drawing/2010/main" xmlns="" w="9525">
+                <a14:hiddenLine xmlns="" xmlns:a14="http://schemas.microsoft.com/office/drawing/2010/main" w="9525">
                   <a:solidFill>
                     <a:srgbClr val="000000"/>
                   </a:solidFill>
@@ -1714,7 +1719,7 @@
             </a:ln>
             <a:extLst>
               <a:ext uri="{91240B29-F687-4f45-9708-019B960494DF}">
-                <a14:hiddenLine xmlns:a14="http://schemas.microsoft.com/office/drawing/2010/main" xmlns="" w="9525">
+                <a14:hiddenLine xmlns="" xmlns:a14="http://schemas.microsoft.com/office/drawing/2010/main" w="9525">
                   <a:solidFill>
                     <a:srgbClr val="000000"/>
                   </a:solidFill>
@@ -1770,7 +1775,7 @@
             </a:ln>
             <a:extLst>
               <a:ext uri="{91240B29-F687-4f45-9708-019B960494DF}">
-                <a14:hiddenLine xmlns:a14="http://schemas.microsoft.com/office/drawing/2010/main" xmlns="" w="9525">
+                <a14:hiddenLine xmlns="" xmlns:a14="http://schemas.microsoft.com/office/drawing/2010/main" w="9525">
                   <a:solidFill>
                     <a:srgbClr val="000000"/>
                   </a:solidFill>
@@ -1860,7 +1865,7 @@
             </a:ln>
             <a:extLst>
               <a:ext uri="{91240B29-F687-4f45-9708-019B960494DF}">
-                <a14:hiddenLine xmlns:a14="http://schemas.microsoft.com/office/drawing/2010/main" xmlns="" w="9525">
+                <a14:hiddenLine xmlns="" xmlns:a14="http://schemas.microsoft.com/office/drawing/2010/main" w="9525">
                   <a:solidFill>
                     <a:srgbClr val="000000"/>
                   </a:solidFill>
@@ -1916,7 +1921,7 @@
             </a:ln>
             <a:extLst>
               <a:ext uri="{91240B29-F687-4f45-9708-019B960494DF}">
-                <a14:hiddenLine xmlns:a14="http://schemas.microsoft.com/office/drawing/2010/main" xmlns="" w="9525">
+                <a14:hiddenLine xmlns="" xmlns:a14="http://schemas.microsoft.com/office/drawing/2010/main" w="9525">
                   <a:solidFill>
                     <a:srgbClr val="000000"/>
                   </a:solidFill>
@@ -2006,7 +2011,7 @@
             </a:ln>
             <a:extLst>
               <a:ext uri="{91240B29-F687-4f45-9708-019B960494DF}">
-                <a14:hiddenLine xmlns:a14="http://schemas.microsoft.com/office/drawing/2010/main" xmlns="" w="9525">
+                <a14:hiddenLine xmlns="" xmlns:a14="http://schemas.microsoft.com/office/drawing/2010/main" w="9525">
                   <a:solidFill>
                     <a:srgbClr val="000000"/>
                   </a:solidFill>
@@ -2074,7 +2079,7 @@
             </a:ln>
             <a:extLst>
               <a:ext uri="{91240B29-F687-4f45-9708-019B960494DF}">
-                <a14:hiddenLine xmlns:a14="http://schemas.microsoft.com/office/drawing/2010/main" xmlns="" w="9525">
+                <a14:hiddenLine xmlns="" xmlns:a14="http://schemas.microsoft.com/office/drawing/2010/main" w="9525">
                   <a:solidFill>
                     <a:srgbClr val="000000"/>
                   </a:solidFill>
@@ -2164,7 +2169,7 @@
             </a:ln>
             <a:extLst>
               <a:ext uri="{91240B29-F687-4f45-9708-019B960494DF}">
-                <a14:hiddenLine xmlns:a14="http://schemas.microsoft.com/office/drawing/2010/main" xmlns="" w="9525">
+                <a14:hiddenLine xmlns="" xmlns:a14="http://schemas.microsoft.com/office/drawing/2010/main" w="9525">
                   <a:solidFill>
                     <a:srgbClr val="000000"/>
                   </a:solidFill>
@@ -2232,7 +2237,7 @@
             </a:ln>
             <a:extLst>
               <a:ext uri="{91240B29-F687-4f45-9708-019B960494DF}">
-                <a14:hiddenLine xmlns:a14="http://schemas.microsoft.com/office/drawing/2010/main" xmlns="" w="9525">
+                <a14:hiddenLine xmlns="" xmlns:a14="http://schemas.microsoft.com/office/drawing/2010/main" w="9525">
                   <a:solidFill>
                     <a:srgbClr val="000000"/>
                   </a:solidFill>
@@ -2322,7 +2327,7 @@
             </a:ln>
             <a:extLst>
               <a:ext uri="{91240B29-F687-4f45-9708-019B960494DF}">
-                <a14:hiddenLine xmlns:a14="http://schemas.microsoft.com/office/drawing/2010/main" xmlns="" w="9525">
+                <a14:hiddenLine xmlns="" xmlns:a14="http://schemas.microsoft.com/office/drawing/2010/main" w="9525">
                   <a:solidFill>
                     <a:srgbClr val="000000"/>
                   </a:solidFill>
@@ -2356,7 +2361,7 @@
             </a:ln>
             <a:extLst>
               <a:ext uri="{91240B29-F687-4f45-9708-019B960494DF}">
-                <a14:hiddenLine xmlns:a14="http://schemas.microsoft.com/office/drawing/2010/main" xmlns="" w="9525">
+                <a14:hiddenLine xmlns="" xmlns:a14="http://schemas.microsoft.com/office/drawing/2010/main" w="9525">
                   <a:solidFill>
                     <a:srgbClr val="000000"/>
                   </a:solidFill>
@@ -2446,7 +2451,7 @@
             </a:ln>
             <a:extLst>
               <a:ext uri="{91240B29-F687-4f45-9708-019B960494DF}">
-                <a14:hiddenLine xmlns:a14="http://schemas.microsoft.com/office/drawing/2010/main" xmlns="" w="9525">
+                <a14:hiddenLine xmlns="" xmlns:a14="http://schemas.microsoft.com/office/drawing/2010/main" w="9525">
                   <a:solidFill>
                     <a:srgbClr val="000000"/>
                   </a:solidFill>
@@ -2508,7 +2513,7 @@
             </a:ln>
             <a:extLst>
               <a:ext uri="{91240B29-F687-4f45-9708-019B960494DF}">
-                <a14:hiddenLine xmlns:a14="http://schemas.microsoft.com/office/drawing/2010/main" xmlns="" w="9525">
+                <a14:hiddenLine xmlns="" xmlns:a14="http://schemas.microsoft.com/office/drawing/2010/main" w="9525">
                   <a:solidFill>
                     <a:srgbClr val="000000"/>
                   </a:solidFill>
@@ -2570,7 +2575,7 @@
             </a:ln>
             <a:extLst>
               <a:ext uri="{91240B29-F687-4f45-9708-019B960494DF}">
-                <a14:hiddenLine xmlns:a14="http://schemas.microsoft.com/office/drawing/2010/main" xmlns="" w="9525">
+                <a14:hiddenLine xmlns="" xmlns:a14="http://schemas.microsoft.com/office/drawing/2010/main" w="9525">
                   <a:solidFill>
                     <a:srgbClr val="000000"/>
                   </a:solidFill>
@@ -2660,7 +2665,7 @@
             </a:ln>
             <a:extLst>
               <a:ext uri="{91240B29-F687-4f45-9708-019B960494DF}">
-                <a14:hiddenLine xmlns:a14="http://schemas.microsoft.com/office/drawing/2010/main" xmlns="" w="9525">
+                <a14:hiddenLine xmlns="" xmlns:a14="http://schemas.microsoft.com/office/drawing/2010/main" w="9525">
                   <a:solidFill>
                     <a:srgbClr val="000000"/>
                   </a:solidFill>
@@ -2728,7 +2733,7 @@
             </a:ln>
             <a:extLst>
               <a:ext uri="{91240B29-F687-4f45-9708-019B960494DF}">
-                <a14:hiddenLine xmlns:a14="http://schemas.microsoft.com/office/drawing/2010/main" xmlns="" w="9525">
+                <a14:hiddenLine xmlns="" xmlns:a14="http://schemas.microsoft.com/office/drawing/2010/main" w="9525">
                   <a:solidFill>
                     <a:srgbClr val="000000"/>
                   </a:solidFill>
@@ -2790,7 +2795,7 @@
             </a:ln>
             <a:extLst>
               <a:ext uri="{91240B29-F687-4f45-9708-019B960494DF}">
-                <a14:hiddenLine xmlns:a14="http://schemas.microsoft.com/office/drawing/2010/main" xmlns="" w="9525">
+                <a14:hiddenLine xmlns="" xmlns:a14="http://schemas.microsoft.com/office/drawing/2010/main" w="9525">
                   <a:solidFill>
                     <a:srgbClr val="000000"/>
                   </a:solidFill>
@@ -2880,7 +2885,7 @@
             </a:ln>
             <a:extLst>
               <a:ext uri="{91240B29-F687-4f45-9708-019B960494DF}">
-                <a14:hiddenLine xmlns:a14="http://schemas.microsoft.com/office/drawing/2010/main" xmlns="" w="9525">
+                <a14:hiddenLine xmlns="" xmlns:a14="http://schemas.microsoft.com/office/drawing/2010/main" w="9525">
                   <a:solidFill>
                     <a:srgbClr val="000000"/>
                   </a:solidFill>
@@ -2942,7 +2947,7 @@
             </a:ln>
             <a:extLst>
               <a:ext uri="{91240B29-F687-4f45-9708-019B960494DF}">
-                <a14:hiddenLine xmlns:a14="http://schemas.microsoft.com/office/drawing/2010/main" xmlns="" w="9525">
+                <a14:hiddenLine xmlns="" xmlns:a14="http://schemas.microsoft.com/office/drawing/2010/main" w="9525">
                   <a:solidFill>
                     <a:srgbClr val="000000"/>
                   </a:solidFill>
@@ -3032,7 +3037,7 @@
             </a:ln>
             <a:extLst>
               <a:ext uri="{91240B29-F687-4f45-9708-019B960494DF}">
-                <a14:hiddenLine xmlns:a14="http://schemas.microsoft.com/office/drawing/2010/main" xmlns="" w="9525">
+                <a14:hiddenLine xmlns="" xmlns:a14="http://schemas.microsoft.com/office/drawing/2010/main" w="9525">
                   <a:solidFill>
                     <a:srgbClr val="000000"/>
                   </a:solidFill>
@@ -3094,7 +3099,7 @@
             </a:ln>
             <a:extLst>
               <a:ext uri="{91240B29-F687-4f45-9708-019B960494DF}">
-                <a14:hiddenLine xmlns:a14="http://schemas.microsoft.com/office/drawing/2010/main" xmlns="" w="9525">
+                <a14:hiddenLine xmlns="" xmlns:a14="http://schemas.microsoft.com/office/drawing/2010/main" w="9525">
                   <a:solidFill>
                     <a:srgbClr val="000000"/>
                   </a:solidFill>
@@ -3184,7 +3189,7 @@
             </a:ln>
             <a:extLst>
               <a:ext uri="{91240B29-F687-4f45-9708-019B960494DF}">
-                <a14:hiddenLine xmlns:a14="http://schemas.microsoft.com/office/drawing/2010/main" xmlns="" w="9525">
+                <a14:hiddenLine xmlns="" xmlns:a14="http://schemas.microsoft.com/office/drawing/2010/main" w="9525">
                   <a:solidFill>
                     <a:srgbClr val="000000"/>
                   </a:solidFill>
@@ -3218,7 +3223,7 @@
             </a:ln>
             <a:extLst>
               <a:ext uri="{91240B29-F687-4f45-9708-019B960494DF}">
-                <a14:hiddenLine xmlns:a14="http://schemas.microsoft.com/office/drawing/2010/main" xmlns="" w="9525">
+                <a14:hiddenLine xmlns="" xmlns:a14="http://schemas.microsoft.com/office/drawing/2010/main" w="9525">
                   <a:solidFill>
                     <a:srgbClr val="000000"/>
                   </a:solidFill>
@@ -3283,7 +3288,7 @@
             </a:ln>
             <a:extLst>
               <a:ext uri="{91240B29-F687-4f45-9708-019B960494DF}">
-                <a14:hiddenLine xmlns:a14="http://schemas.microsoft.com/office/drawing/2010/main" xmlns="" w="9525">
+                <a14:hiddenLine xmlns="" xmlns:a14="http://schemas.microsoft.com/office/drawing/2010/main" w="9525">
                   <a:solidFill>
                     <a:srgbClr val="000000"/>
                   </a:solidFill>
@@ -3373,7 +3378,7 @@
             </a:ln>
             <a:extLst>
               <a:ext uri="{91240B29-F687-4f45-9708-019B960494DF}">
-                <a14:hiddenLine xmlns:a14="http://schemas.microsoft.com/office/drawing/2010/main" xmlns="" w="9525">
+                <a14:hiddenLine xmlns="" xmlns:a14="http://schemas.microsoft.com/office/drawing/2010/main" w="9525">
                   <a:solidFill>
                     <a:srgbClr val="000000"/>
                   </a:solidFill>
@@ -3435,7 +3440,7 @@
             </a:ln>
             <a:extLst>
               <a:ext uri="{91240B29-F687-4f45-9708-019B960494DF}">
-                <a14:hiddenLine xmlns:a14="http://schemas.microsoft.com/office/drawing/2010/main" xmlns="" w="9525">
+                <a14:hiddenLine xmlns="" xmlns:a14="http://schemas.microsoft.com/office/drawing/2010/main" w="9525">
                   <a:solidFill>
                     <a:srgbClr val="000000"/>
                   </a:solidFill>
@@ -3525,7 +3530,7 @@
             </a:ln>
             <a:extLst>
               <a:ext uri="{91240B29-F687-4f45-9708-019B960494DF}">
-                <a14:hiddenLine xmlns:a14="http://schemas.microsoft.com/office/drawing/2010/main" xmlns="" w="9525">
+                <a14:hiddenLine xmlns="" xmlns:a14="http://schemas.microsoft.com/office/drawing/2010/main" w="9525">
                   <a:solidFill>
                     <a:srgbClr val="000000"/>
                   </a:solidFill>
@@ -3615,7 +3620,7 @@
             </a:ln>
             <a:extLst>
               <a:ext uri="{91240B29-F687-4f45-9708-019B960494DF}">
-                <a14:hiddenLine xmlns:a14="http://schemas.microsoft.com/office/drawing/2010/main" xmlns="" w="9525">
+                <a14:hiddenLine xmlns="" xmlns:a14="http://schemas.microsoft.com/office/drawing/2010/main" w="9525">
                   <a:solidFill>
                     <a:srgbClr val="000000"/>
                   </a:solidFill>
@@ -3680,7 +3685,7 @@
             </a:ln>
             <a:extLst>
               <a:ext uri="{91240B29-F687-4f45-9708-019B960494DF}">
-                <a14:hiddenLine xmlns:a14="http://schemas.microsoft.com/office/drawing/2010/main" xmlns="" w="9525">
+                <a14:hiddenLine xmlns="" xmlns:a14="http://schemas.microsoft.com/office/drawing/2010/main" w="9525">
                   <a:solidFill>
                     <a:srgbClr val="000000"/>
                   </a:solidFill>
@@ -3742,7 +3747,7 @@
             </a:ln>
             <a:extLst>
               <a:ext uri="{91240B29-F687-4f45-9708-019B960494DF}">
-                <a14:hiddenLine xmlns:a14="http://schemas.microsoft.com/office/drawing/2010/main" xmlns="" w="9525">
+                <a14:hiddenLine xmlns="" xmlns:a14="http://schemas.microsoft.com/office/drawing/2010/main" w="9525">
                   <a:solidFill>
                     <a:srgbClr val="000000"/>
                   </a:solidFill>
@@ -3832,7 +3837,7 @@
             </a:ln>
             <a:extLst>
               <a:ext uri="{91240B29-F687-4f45-9708-019B960494DF}">
-                <a14:hiddenLine xmlns:a14="http://schemas.microsoft.com/office/drawing/2010/main" xmlns="" w="9525">
+                <a14:hiddenLine xmlns="" xmlns:a14="http://schemas.microsoft.com/office/drawing/2010/main" w="9525">
                   <a:solidFill>
                     <a:srgbClr val="000000"/>
                   </a:solidFill>
@@ -3922,7 +3927,7 @@
             </a:ln>
             <a:extLst>
               <a:ext uri="{91240B29-F687-4f45-9708-019B960494DF}">
-                <a14:hiddenLine xmlns:a14="http://schemas.microsoft.com/office/drawing/2010/main" xmlns="" w="9525">
+                <a14:hiddenLine xmlns="" xmlns:a14="http://schemas.microsoft.com/office/drawing/2010/main" w="9525">
                   <a:solidFill>
                     <a:srgbClr val="000000"/>
                   </a:solidFill>
@@ -3984,7 +3989,7 @@
             </a:ln>
             <a:extLst>
               <a:ext uri="{91240B29-F687-4f45-9708-019B960494DF}">
-                <a14:hiddenLine xmlns:a14="http://schemas.microsoft.com/office/drawing/2010/main" xmlns="" w="9525">
+                <a14:hiddenLine xmlns="" xmlns:a14="http://schemas.microsoft.com/office/drawing/2010/main" w="9525">
                   <a:solidFill>
                     <a:srgbClr val="000000"/>
                   </a:solidFill>
@@ -4104,7 +4109,7 @@
             </a:ln>
             <a:extLst>
               <a:ext uri="{91240B29-F687-4f45-9708-019B960494DF}">
-                <a14:hiddenLine xmlns:a14="http://schemas.microsoft.com/office/drawing/2010/main" xmlns="" w="9525">
+                <a14:hiddenLine xmlns="" xmlns:a14="http://schemas.microsoft.com/office/drawing/2010/main" w="9525">
                   <a:solidFill>
                     <a:srgbClr val="000000"/>
                   </a:solidFill>
@@ -4172,7 +4177,7 @@
             </a:ln>
             <a:extLst>
               <a:ext uri="{91240B29-F687-4f45-9708-019B960494DF}">
-                <a14:hiddenLine xmlns:a14="http://schemas.microsoft.com/office/drawing/2010/main" xmlns="" w="9525">
+                <a14:hiddenLine xmlns="" xmlns:a14="http://schemas.microsoft.com/office/drawing/2010/main" w="9525">
                   <a:solidFill>
                     <a:srgbClr val="000000"/>
                   </a:solidFill>
@@ -4262,7 +4267,7 @@
             </a:ln>
             <a:extLst>
               <a:ext uri="{91240B29-F687-4f45-9708-019B960494DF}">
-                <a14:hiddenLine xmlns:a14="http://schemas.microsoft.com/office/drawing/2010/main" xmlns="" w="9525">
+                <a14:hiddenLine xmlns="" xmlns:a14="http://schemas.microsoft.com/office/drawing/2010/main" w="9525">
                   <a:solidFill>
                     <a:srgbClr val="000000"/>
                   </a:solidFill>
@@ -4402,7 +4407,7 @@
           <a:p>
             <a:fld id="{48A87A34-81AB-432B-8DAE-1953F412C126}" type="datetimeFigureOut">
               <a:rPr lang="en-US" dirty="0"/>
-              <a:t>3/6/2016</a:t>
+              <a:t>3/8/2016</a:t>
             </a:fld>
             <a:endParaRPr lang="en-US" dirty="0"/>
           </a:p>
@@ -4664,7 +4669,7 @@
           <a:p>
             <a:fld id="{48A87A34-81AB-432B-8DAE-1953F412C126}" type="datetimeFigureOut">
               <a:rPr lang="en-US" dirty="0"/>
-              <a:t>3/6/2016</a:t>
+              <a:t>3/8/2016</a:t>
             </a:fld>
             <a:endParaRPr lang="en-US" dirty="0"/>
           </a:p>
@@ -4855,7 +4860,7 @@
           <a:p>
             <a:fld id="{48A87A34-81AB-432B-8DAE-1953F412C126}" type="datetimeFigureOut">
               <a:rPr lang="en-US" dirty="0"/>
-              <a:t>3/6/2016</a:t>
+              <a:t>3/8/2016</a:t>
             </a:fld>
             <a:endParaRPr lang="en-US" dirty="0"/>
           </a:p>
@@ -5113,7 +5118,7 @@
           <a:p>
             <a:fld id="{48A87A34-81AB-432B-8DAE-1953F412C126}" type="datetimeFigureOut">
               <a:rPr lang="en-US" dirty="0"/>
-              <a:t>3/6/2016</a:t>
+              <a:t>3/8/2016</a:t>
             </a:fld>
             <a:endParaRPr lang="en-US" dirty="0"/>
           </a:p>
@@ -5542,7 +5547,7 @@
           <a:p>
             <a:fld id="{48A87A34-81AB-432B-8DAE-1953F412C126}" type="datetimeFigureOut">
               <a:rPr lang="en-US" dirty="0"/>
-              <a:t>3/6/2016</a:t>
+              <a:t>3/8/2016</a:t>
             </a:fld>
             <a:endParaRPr lang="en-US" dirty="0"/>
           </a:p>
@@ -6083,7 +6088,7 @@
           <a:p>
             <a:fld id="{48A87A34-81AB-432B-8DAE-1953F412C126}" type="datetimeFigureOut">
               <a:rPr lang="en-US" dirty="0"/>
-              <a:t>3/6/2016</a:t>
+              <a:t>3/8/2016</a:t>
             </a:fld>
             <a:endParaRPr lang="en-US" dirty="0"/>
           </a:p>
@@ -6798,7 +6803,7 @@
           <a:p>
             <a:fld id="{48A87A34-81AB-432B-8DAE-1953F412C126}" type="datetimeFigureOut">
               <a:rPr lang="en-US" dirty="0"/>
-              <a:t>3/6/2016</a:t>
+              <a:t>3/8/2016</a:t>
             </a:fld>
             <a:endParaRPr lang="en-US" dirty="0"/>
           </a:p>
@@ -6963,7 +6968,7 @@
           <a:p>
             <a:fld id="{48A87A34-81AB-432B-8DAE-1953F412C126}" type="datetimeFigureOut">
               <a:rPr lang="en-US" dirty="0"/>
-              <a:t>3/6/2016</a:t>
+              <a:t>3/8/2016</a:t>
             </a:fld>
             <a:endParaRPr lang="en-US" dirty="0"/>
           </a:p>
@@ -7138,7 +7143,7 @@
           <a:p>
             <a:fld id="{48A87A34-81AB-432B-8DAE-1953F412C126}" type="datetimeFigureOut">
               <a:rPr lang="en-US" dirty="0"/>
-              <a:t>3/6/2016</a:t>
+              <a:t>3/8/2016</a:t>
             </a:fld>
             <a:endParaRPr lang="en-US" dirty="0"/>
           </a:p>
@@ -7303,7 +7308,7 @@
           <a:p>
             <a:fld id="{48A87A34-81AB-432B-8DAE-1953F412C126}" type="datetimeFigureOut">
               <a:rPr lang="en-US" dirty="0"/>
-              <a:t>3/6/2016</a:t>
+              <a:t>3/8/2016</a:t>
             </a:fld>
             <a:endParaRPr lang="en-US" dirty="0"/>
           </a:p>
@@ -7548,7 +7553,7 @@
           <a:p>
             <a:fld id="{48A87A34-81AB-432B-8DAE-1953F412C126}" type="datetimeFigureOut">
               <a:rPr lang="en-US" dirty="0"/>
-              <a:t>3/6/2016</a:t>
+              <a:t>3/8/2016</a:t>
             </a:fld>
             <a:endParaRPr lang="en-US" dirty="0"/>
           </a:p>
@@ -7775,7 +7780,7 @@
           <a:p>
             <a:fld id="{48A87A34-81AB-432B-8DAE-1953F412C126}" type="datetimeFigureOut">
               <a:rPr lang="en-US" dirty="0"/>
-              <a:t>3/6/2016</a:t>
+              <a:t>3/8/2016</a:t>
             </a:fld>
             <a:endParaRPr lang="en-US" dirty="0"/>
           </a:p>
@@ -8151,7 +8156,7 @@
           <a:p>
             <a:fld id="{48A87A34-81AB-432B-8DAE-1953F412C126}" type="datetimeFigureOut">
               <a:rPr lang="en-US" dirty="0"/>
-              <a:t>3/6/2016</a:t>
+              <a:t>3/8/2016</a:t>
             </a:fld>
             <a:endParaRPr lang="en-US" dirty="0"/>
           </a:p>
@@ -8264,7 +8269,7 @@
           <a:p>
             <a:fld id="{48A87A34-81AB-432B-8DAE-1953F412C126}" type="datetimeFigureOut">
               <a:rPr lang="en-US" dirty="0"/>
-              <a:t>3/6/2016</a:t>
+              <a:t>3/8/2016</a:t>
             </a:fld>
             <a:endParaRPr lang="en-US" dirty="0"/>
           </a:p>
@@ -8354,7 +8359,7 @@
           <a:p>
             <a:fld id="{48A87A34-81AB-432B-8DAE-1953F412C126}" type="datetimeFigureOut">
               <a:rPr lang="en-US" dirty="0"/>
-              <a:t>3/6/2016</a:t>
+              <a:t>3/8/2016</a:t>
             </a:fld>
             <a:endParaRPr lang="en-US" dirty="0"/>
           </a:p>
@@ -8598,7 +8603,7 @@
           <a:p>
             <a:fld id="{48A87A34-81AB-432B-8DAE-1953F412C126}" type="datetimeFigureOut">
               <a:rPr lang="en-US" dirty="0"/>
-              <a:t>3/6/2016</a:t>
+              <a:t>3/8/2016</a:t>
             </a:fld>
             <a:endParaRPr lang="en-US" dirty="0"/>
           </a:p>
@@ -8873,7 +8878,7 @@
           <a:p>
             <a:fld id="{48A87A34-81AB-432B-8DAE-1953F412C126}" type="datetimeFigureOut">
               <a:rPr lang="en-US" dirty="0"/>
-              <a:t>3/6/2016</a:t>
+              <a:t>3/8/2016</a:t>
             </a:fld>
             <a:endParaRPr lang="en-US" dirty="0"/>
           </a:p>
@@ -8984,7 +8989,7 @@
           <a:noFill/>
           <a:extLst>
             <a:ext uri="{909E8E84-426E-40dd-AFC4-6F175D3DCCD1}">
-              <a14:hiddenFill xmlns:a14="http://schemas.microsoft.com/office/drawing/2010/main" xmlns="">
+              <a14:hiddenFill xmlns="" xmlns:a14="http://schemas.microsoft.com/office/drawing/2010/main">
                 <a:solidFill>
                   <a:srgbClr val="FFFFFF"/>
                 </a:solidFill>
@@ -9058,7 +9063,7 @@
               </a:ln>
               <a:extLst>
                 <a:ext uri="{91240B29-F687-4f45-9708-019B960494DF}">
-                  <a14:hiddenLine xmlns:a14="http://schemas.microsoft.com/office/drawing/2010/main" xmlns="" w="9525">
+                  <a14:hiddenLine xmlns="" xmlns:a14="http://schemas.microsoft.com/office/drawing/2010/main" w="9525">
                     <a:solidFill>
                       <a:srgbClr val="000000"/>
                     </a:solidFill>
@@ -9148,7 +9153,7 @@
               </a:ln>
               <a:extLst>
                 <a:ext uri="{91240B29-F687-4f45-9708-019B960494DF}">
-                  <a14:hiddenLine xmlns:a14="http://schemas.microsoft.com/office/drawing/2010/main" xmlns="" w="9525">
+                  <a14:hiddenLine xmlns="" xmlns:a14="http://schemas.microsoft.com/office/drawing/2010/main" w="9525">
                     <a:solidFill>
                       <a:srgbClr val="000000"/>
                     </a:solidFill>
@@ -9238,7 +9243,7 @@
               </a:ln>
               <a:extLst>
                 <a:ext uri="{91240B29-F687-4f45-9708-019B960494DF}">
-                  <a14:hiddenLine xmlns:a14="http://schemas.microsoft.com/office/drawing/2010/main" xmlns="" w="9525">
+                  <a14:hiddenLine xmlns="" xmlns:a14="http://schemas.microsoft.com/office/drawing/2010/main" w="9525">
                     <a:solidFill>
                       <a:srgbClr val="000000"/>
                     </a:solidFill>
@@ -9300,7 +9305,7 @@
               </a:ln>
               <a:extLst>
                 <a:ext uri="{91240B29-F687-4f45-9708-019B960494DF}">
-                  <a14:hiddenLine xmlns:a14="http://schemas.microsoft.com/office/drawing/2010/main" xmlns="" w="9525">
+                  <a14:hiddenLine xmlns="" xmlns:a14="http://schemas.microsoft.com/office/drawing/2010/main" w="9525">
                     <a:solidFill>
                       <a:srgbClr val="000000"/>
                     </a:solidFill>
@@ -9390,7 +9395,7 @@
               </a:ln>
               <a:extLst>
                 <a:ext uri="{91240B29-F687-4f45-9708-019B960494DF}">
-                  <a14:hiddenLine xmlns:a14="http://schemas.microsoft.com/office/drawing/2010/main" xmlns="" w="9525">
+                  <a14:hiddenLine xmlns="" xmlns:a14="http://schemas.microsoft.com/office/drawing/2010/main" w="9525">
                     <a:solidFill>
                       <a:srgbClr val="000000"/>
                     </a:solidFill>
@@ -9452,7 +9457,7 @@
               </a:ln>
               <a:extLst>
                 <a:ext uri="{91240B29-F687-4f45-9708-019B960494DF}">
-                  <a14:hiddenLine xmlns:a14="http://schemas.microsoft.com/office/drawing/2010/main" xmlns="" w="9525">
+                  <a14:hiddenLine xmlns="" xmlns:a14="http://schemas.microsoft.com/office/drawing/2010/main" w="9525">
                     <a:solidFill>
                       <a:srgbClr val="000000"/>
                     </a:solidFill>
@@ -9514,7 +9519,7 @@
               </a:ln>
               <a:extLst>
                 <a:ext uri="{91240B29-F687-4f45-9708-019B960494DF}">
-                  <a14:hiddenLine xmlns:a14="http://schemas.microsoft.com/office/drawing/2010/main" xmlns="" w="9525">
+                  <a14:hiddenLine xmlns="" xmlns:a14="http://schemas.microsoft.com/office/drawing/2010/main" w="9525">
                     <a:solidFill>
                       <a:srgbClr val="000000"/>
                     </a:solidFill>
@@ -9604,7 +9609,7 @@
               </a:ln>
               <a:extLst>
                 <a:ext uri="{91240B29-F687-4f45-9708-019B960494DF}">
-                  <a14:hiddenLine xmlns:a14="http://schemas.microsoft.com/office/drawing/2010/main" xmlns="" w="9525">
+                  <a14:hiddenLine xmlns="" xmlns:a14="http://schemas.microsoft.com/office/drawing/2010/main" w="9525">
                     <a:solidFill>
                       <a:srgbClr val="000000"/>
                     </a:solidFill>
@@ -9694,7 +9699,7 @@
               </a:ln>
               <a:extLst>
                 <a:ext uri="{91240B29-F687-4f45-9708-019B960494DF}">
-                  <a14:hiddenLine xmlns:a14="http://schemas.microsoft.com/office/drawing/2010/main" xmlns="" w="9525">
+                  <a14:hiddenLine xmlns="" xmlns:a14="http://schemas.microsoft.com/office/drawing/2010/main" w="9525">
                     <a:solidFill>
                       <a:srgbClr val="000000"/>
                     </a:solidFill>
@@ -9756,7 +9761,7 @@
               </a:ln>
               <a:extLst>
                 <a:ext uri="{91240B29-F687-4f45-9708-019B960494DF}">
-                  <a14:hiddenLine xmlns:a14="http://schemas.microsoft.com/office/drawing/2010/main" xmlns="" w="9525">
+                  <a14:hiddenLine xmlns="" xmlns:a14="http://schemas.microsoft.com/office/drawing/2010/main" w="9525">
                     <a:solidFill>
                       <a:srgbClr val="000000"/>
                     </a:solidFill>
@@ -9866,7 +9871,7 @@
               </a:ln>
               <a:extLst>
                 <a:ext uri="{91240B29-F687-4f45-9708-019B960494DF}">
-                  <a14:hiddenLine xmlns:a14="http://schemas.microsoft.com/office/drawing/2010/main" xmlns="" w="9525">
+                  <a14:hiddenLine xmlns="" xmlns:a14="http://schemas.microsoft.com/office/drawing/2010/main" w="9525">
                     <a:solidFill>
                       <a:srgbClr val="000000"/>
                     </a:solidFill>
@@ -9950,7 +9955,7 @@
               </a:ln>
               <a:extLst>
                 <a:ext uri="{91240B29-F687-4f45-9708-019B960494DF}">
-                  <a14:hiddenLine xmlns:a14="http://schemas.microsoft.com/office/drawing/2010/main" xmlns="" w="9525">
+                  <a14:hiddenLine xmlns="" xmlns:a14="http://schemas.microsoft.com/office/drawing/2010/main" w="9525">
                     <a:solidFill>
                       <a:srgbClr val="000000"/>
                     </a:solidFill>
@@ -10012,7 +10017,7 @@
               </a:ln>
               <a:extLst>
                 <a:ext uri="{91240B29-F687-4f45-9708-019B960494DF}">
-                  <a14:hiddenLine xmlns:a14="http://schemas.microsoft.com/office/drawing/2010/main" xmlns="" w="9525">
+                  <a14:hiddenLine xmlns="" xmlns:a14="http://schemas.microsoft.com/office/drawing/2010/main" w="9525">
                     <a:solidFill>
                       <a:srgbClr val="000000"/>
                     </a:solidFill>
@@ -10074,7 +10079,7 @@
               </a:ln>
               <a:extLst>
                 <a:ext uri="{91240B29-F687-4f45-9708-019B960494DF}">
-                  <a14:hiddenLine xmlns:a14="http://schemas.microsoft.com/office/drawing/2010/main" xmlns="" w="9525">
+                  <a14:hiddenLine xmlns="" xmlns:a14="http://schemas.microsoft.com/office/drawing/2010/main" w="9525">
                     <a:solidFill>
                       <a:srgbClr val="000000"/>
                     </a:solidFill>
@@ -10164,7 +10169,7 @@
               </a:ln>
               <a:extLst>
                 <a:ext uri="{91240B29-F687-4f45-9708-019B960494DF}">
-                  <a14:hiddenLine xmlns:a14="http://schemas.microsoft.com/office/drawing/2010/main" xmlns="" w="9525">
+                  <a14:hiddenLine xmlns="" xmlns:a14="http://schemas.microsoft.com/office/drawing/2010/main" w="9525">
                     <a:solidFill>
                       <a:srgbClr val="000000"/>
                     </a:solidFill>
@@ -10198,7 +10203,7 @@
               </a:ln>
               <a:extLst>
                 <a:ext uri="{91240B29-F687-4f45-9708-019B960494DF}">
-                  <a14:hiddenLine xmlns:a14="http://schemas.microsoft.com/office/drawing/2010/main" xmlns="" w="9525">
+                  <a14:hiddenLine xmlns="" xmlns:a14="http://schemas.microsoft.com/office/drawing/2010/main" w="9525">
                     <a:solidFill>
                       <a:srgbClr val="000000"/>
                     </a:solidFill>
@@ -10263,7 +10268,7 @@
               </a:ln>
               <a:extLst>
                 <a:ext uri="{91240B29-F687-4f45-9708-019B960494DF}">
-                  <a14:hiddenLine xmlns:a14="http://schemas.microsoft.com/office/drawing/2010/main" xmlns="" w="9525">
+                  <a14:hiddenLine xmlns="" xmlns:a14="http://schemas.microsoft.com/office/drawing/2010/main" w="9525">
                     <a:solidFill>
                       <a:srgbClr val="000000"/>
                     </a:solidFill>
@@ -10353,7 +10358,7 @@
               </a:ln>
               <a:extLst>
                 <a:ext uri="{91240B29-F687-4f45-9708-019B960494DF}">
-                  <a14:hiddenLine xmlns:a14="http://schemas.microsoft.com/office/drawing/2010/main" xmlns="" w="9525">
+                  <a14:hiddenLine xmlns="" xmlns:a14="http://schemas.microsoft.com/office/drawing/2010/main" w="9525">
                     <a:solidFill>
                       <a:srgbClr val="000000"/>
                     </a:solidFill>
@@ -10415,7 +10420,7 @@
               </a:ln>
               <a:extLst>
                 <a:ext uri="{91240B29-F687-4f45-9708-019B960494DF}">
-                  <a14:hiddenLine xmlns:a14="http://schemas.microsoft.com/office/drawing/2010/main" xmlns="" w="9525">
+                  <a14:hiddenLine xmlns="" xmlns:a14="http://schemas.microsoft.com/office/drawing/2010/main" w="9525">
                     <a:solidFill>
                       <a:srgbClr val="000000"/>
                     </a:solidFill>
@@ -10505,7 +10510,7 @@
               </a:ln>
               <a:extLst>
                 <a:ext uri="{91240B29-F687-4f45-9708-019B960494DF}">
-                  <a14:hiddenLine xmlns:a14="http://schemas.microsoft.com/office/drawing/2010/main" xmlns="" w="9525">
+                  <a14:hiddenLine xmlns="" xmlns:a14="http://schemas.microsoft.com/office/drawing/2010/main" w="9525">
                     <a:solidFill>
                       <a:srgbClr val="000000"/>
                     </a:solidFill>
@@ -10570,7 +10575,7 @@
               </a:ln>
               <a:extLst>
                 <a:ext uri="{91240B29-F687-4f45-9708-019B960494DF}">
-                  <a14:hiddenLine xmlns:a14="http://schemas.microsoft.com/office/drawing/2010/main" xmlns="" w="9525">
+                  <a14:hiddenLine xmlns="" xmlns:a14="http://schemas.microsoft.com/office/drawing/2010/main" w="9525">
                     <a:solidFill>
                       <a:srgbClr val="000000"/>
                     </a:solidFill>
@@ -10632,7 +10637,7 @@
               </a:ln>
               <a:extLst>
                 <a:ext uri="{91240B29-F687-4f45-9708-019B960494DF}">
-                  <a14:hiddenLine xmlns:a14="http://schemas.microsoft.com/office/drawing/2010/main" xmlns="" w="9525">
+                  <a14:hiddenLine xmlns="" xmlns:a14="http://schemas.microsoft.com/office/drawing/2010/main" w="9525">
                     <a:solidFill>
                       <a:srgbClr val="000000"/>
                     </a:solidFill>
@@ -10722,7 +10727,7 @@
               </a:ln>
               <a:extLst>
                 <a:ext uri="{91240B29-F687-4f45-9708-019B960494DF}">
-                  <a14:hiddenLine xmlns:a14="http://schemas.microsoft.com/office/drawing/2010/main" xmlns="" w="9525">
+                  <a14:hiddenLine xmlns="" xmlns:a14="http://schemas.microsoft.com/office/drawing/2010/main" w="9525">
                     <a:solidFill>
                       <a:srgbClr val="000000"/>
                     </a:solidFill>
@@ -10812,7 +10817,7 @@
               </a:ln>
               <a:extLst>
                 <a:ext uri="{91240B29-F687-4f45-9708-019B960494DF}">
-                  <a14:hiddenLine xmlns:a14="http://schemas.microsoft.com/office/drawing/2010/main" xmlns="" w="9525">
+                  <a14:hiddenLine xmlns="" xmlns:a14="http://schemas.microsoft.com/office/drawing/2010/main" w="9525">
                     <a:solidFill>
                       <a:srgbClr val="000000"/>
                     </a:solidFill>
@@ -10877,7 +10882,7 @@
               </a:ln>
               <a:extLst>
                 <a:ext uri="{91240B29-F687-4f45-9708-019B960494DF}">
-                  <a14:hiddenLine xmlns:a14="http://schemas.microsoft.com/office/drawing/2010/main" xmlns="" w="9525">
+                  <a14:hiddenLine xmlns="" xmlns:a14="http://schemas.microsoft.com/office/drawing/2010/main" w="9525">
                     <a:solidFill>
                       <a:srgbClr val="000000"/>
                     </a:solidFill>
@@ -10997,7 +11002,7 @@
               </a:ln>
               <a:extLst>
                 <a:ext uri="{91240B29-F687-4f45-9708-019B960494DF}">
-                  <a14:hiddenLine xmlns:a14="http://schemas.microsoft.com/office/drawing/2010/main" xmlns="" w="9525">
+                  <a14:hiddenLine xmlns="" xmlns:a14="http://schemas.microsoft.com/office/drawing/2010/main" w="9525">
                     <a:solidFill>
                       <a:srgbClr val="000000"/>
                     </a:solidFill>
@@ -11095,7 +11100,7 @@
               </a:ln>
               <a:extLst>
                 <a:ext uri="{91240B29-F687-4f45-9708-019B960494DF}">
-                  <a14:hiddenLine xmlns:a14="http://schemas.microsoft.com/office/drawing/2010/main" xmlns="" w="9525">
+                  <a14:hiddenLine xmlns="" xmlns:a14="http://schemas.microsoft.com/office/drawing/2010/main" w="9525">
                     <a:solidFill>
                       <a:srgbClr val="000000"/>
                     </a:solidFill>
@@ -11210,7 +11215,7 @@
               </a:ln>
               <a:extLst>
                 <a:ext uri="{91240B29-F687-4f45-9708-019B960494DF}">
-                  <a14:hiddenLine xmlns:a14="http://schemas.microsoft.com/office/drawing/2010/main" xmlns="" w="9525">
+                  <a14:hiddenLine xmlns="" xmlns:a14="http://schemas.microsoft.com/office/drawing/2010/main" w="9525">
                     <a:solidFill>
                       <a:srgbClr val="000000"/>
                     </a:solidFill>
@@ -11300,7 +11305,7 @@
               </a:ln>
               <a:extLst>
                 <a:ext uri="{91240B29-F687-4f45-9708-019B960494DF}">
-                  <a14:hiddenLine xmlns:a14="http://schemas.microsoft.com/office/drawing/2010/main" xmlns="" w="9525">
+                  <a14:hiddenLine xmlns="" xmlns:a14="http://schemas.microsoft.com/office/drawing/2010/main" w="9525">
                     <a:solidFill>
                       <a:srgbClr val="000000"/>
                     </a:solidFill>
@@ -11365,7 +11370,7 @@
               </a:ln>
               <a:extLst>
                 <a:ext uri="{91240B29-F687-4f45-9708-019B960494DF}">
-                  <a14:hiddenLine xmlns:a14="http://schemas.microsoft.com/office/drawing/2010/main" xmlns="" w="9525">
+                  <a14:hiddenLine xmlns="" xmlns:a14="http://schemas.microsoft.com/office/drawing/2010/main" w="9525">
                     <a:solidFill>
                       <a:srgbClr val="000000"/>
                     </a:solidFill>
@@ -11455,7 +11460,7 @@
               </a:ln>
               <a:extLst>
                 <a:ext uri="{91240B29-F687-4f45-9708-019B960494DF}">
-                  <a14:hiddenLine xmlns:a14="http://schemas.microsoft.com/office/drawing/2010/main" xmlns="" w="9525">
+                  <a14:hiddenLine xmlns="" xmlns:a14="http://schemas.microsoft.com/office/drawing/2010/main" w="9525">
                     <a:solidFill>
                       <a:srgbClr val="000000"/>
                     </a:solidFill>
@@ -11523,7 +11528,7 @@
               </a:ln>
               <a:extLst>
                 <a:ext uri="{91240B29-F687-4f45-9708-019B960494DF}">
-                  <a14:hiddenLine xmlns:a14="http://schemas.microsoft.com/office/drawing/2010/main" xmlns="" w="9525">
+                  <a14:hiddenLine xmlns="" xmlns:a14="http://schemas.microsoft.com/office/drawing/2010/main" w="9525">
                     <a:solidFill>
                       <a:srgbClr val="000000"/>
                     </a:solidFill>
@@ -11613,7 +11618,7 @@
               </a:ln>
               <a:extLst>
                 <a:ext uri="{91240B29-F687-4f45-9708-019B960494DF}">
-                  <a14:hiddenLine xmlns:a14="http://schemas.microsoft.com/office/drawing/2010/main" xmlns="" w="9525">
+                  <a14:hiddenLine xmlns="" xmlns:a14="http://schemas.microsoft.com/office/drawing/2010/main" w="9525">
                     <a:solidFill>
                       <a:srgbClr val="000000"/>
                     </a:solidFill>
@@ -11681,7 +11686,7 @@
               </a:ln>
               <a:extLst>
                 <a:ext uri="{91240B29-F687-4f45-9708-019B960494DF}">
-                  <a14:hiddenLine xmlns:a14="http://schemas.microsoft.com/office/drawing/2010/main" xmlns="" w="9525">
+                  <a14:hiddenLine xmlns="" xmlns:a14="http://schemas.microsoft.com/office/drawing/2010/main" w="9525">
                     <a:solidFill>
                       <a:srgbClr val="000000"/>
                     </a:solidFill>
@@ -11771,7 +11776,7 @@
               </a:ln>
               <a:extLst>
                 <a:ext uri="{91240B29-F687-4f45-9708-019B960494DF}">
-                  <a14:hiddenLine xmlns:a14="http://schemas.microsoft.com/office/drawing/2010/main" xmlns="" w="9525">
+                  <a14:hiddenLine xmlns="" xmlns:a14="http://schemas.microsoft.com/office/drawing/2010/main" w="9525">
                     <a:solidFill>
                       <a:srgbClr val="000000"/>
                     </a:solidFill>
@@ -11805,7 +11810,7 @@
               </a:ln>
               <a:extLst>
                 <a:ext uri="{91240B29-F687-4f45-9708-019B960494DF}">
-                  <a14:hiddenLine xmlns:a14="http://schemas.microsoft.com/office/drawing/2010/main" xmlns="" w="9525">
+                  <a14:hiddenLine xmlns="" xmlns:a14="http://schemas.microsoft.com/office/drawing/2010/main" w="9525">
                     <a:solidFill>
                       <a:srgbClr val="000000"/>
                     </a:solidFill>
@@ -11946,7 +11951,7 @@
             <a:fld id="{48A87A34-81AB-432B-8DAE-1953F412C126}" type="datetimeFigureOut">
               <a:rPr lang="en-US" dirty="0"/>
               <a:pPr/>
-              <a:t>3/6/2016</a:t>
+              <a:t>3/8/2016</a:t>
             </a:fld>
             <a:endParaRPr lang="en-US" dirty="0"/>
           </a:p>
@@ -12364,42 +12369,6 @@
       </p:grpSpPr>
       <p:sp>
         <p:nvSpPr>
-          <p:cNvPr id="2" name="Title 1"/>
-          <p:cNvSpPr>
-            <a:spLocks noGrp="1"/>
-          </p:cNvSpPr>
-          <p:nvPr>
-            <p:ph type="ctrTitle"/>
-          </p:nvPr>
-        </p:nvSpPr>
-        <p:spPr/>
-        <p:txBody>
-          <a:bodyPr/>
-          <a:lstStyle/>
-          <a:p>
-            <a:pPr algn="ctr"/>
-            <a:r>
-              <a:rPr lang="en-US" dirty="0" smtClean="0">
-                <a:latin typeface="Bell MT" panose="02020503060305020303" pitchFamily="18" charset="0"/>
-                <a:cs typeface="Arial" panose="020B0604020202020204" pitchFamily="34" charset="0"/>
-              </a:rPr>
-              <a:t>Handyman</a:t>
-            </a:r>
-            <a:br>
-              <a:rPr lang="en-US" dirty="0" smtClean="0">
-                <a:latin typeface="Bell MT" panose="02020503060305020303" pitchFamily="18" charset="0"/>
-                <a:cs typeface="Arial" panose="020B0604020202020204" pitchFamily="34" charset="0"/>
-              </a:rPr>
-            </a:br>
-            <a:endParaRPr lang="en-US" dirty="0">
-              <a:latin typeface="Bell MT" panose="02020503060305020303" pitchFamily="18" charset="0"/>
-              <a:cs typeface="Arial" panose="020B0604020202020204" pitchFamily="34" charset="0"/>
-            </a:endParaRPr>
-          </a:p>
-        </p:txBody>
-      </p:sp>
-      <p:sp>
-        <p:nvSpPr>
           <p:cNvPr id="3" name="Subtitle 2"/>
           <p:cNvSpPr>
             <a:spLocks noGrp="1"/>
@@ -12470,6 +12439,36 @@
           </a:p>
         </p:txBody>
       </p:sp>
+      <p:pic>
+        <p:nvPicPr>
+          <p:cNvPr id="4" name="Picture 3"/>
+          <p:cNvPicPr>
+            <a:picLocks noChangeAspect="1"/>
+          </p:cNvPicPr>
+          <p:nvPr/>
+        </p:nvPicPr>
+        <p:blipFill>
+          <a:blip r:embed="rId2">
+            <a:extLst>
+              <a:ext uri="{28A0092B-C50C-407E-A947-70E740481C1C}">
+                <a14:useLocalDpi xmlns:a14="http://schemas.microsoft.com/office/drawing/2010/main" val="0"/>
+              </a:ext>
+            </a:extLst>
+          </a:blip>
+          <a:stretch>
+            <a:fillRect/>
+          </a:stretch>
+        </p:blipFill>
+        <p:spPr>
+          <a:xfrm>
+            <a:off x="1068947" y="311908"/>
+            <a:ext cx="10058400" cy="3290130"/>
+          </a:xfrm>
+          <a:prstGeom prst="rect">
+            <a:avLst/>
+          </a:prstGeom>
+        </p:spPr>
+      </p:pic>
     </p:spTree>
     <p:extLst>
       <p:ext uri="{BB962C8B-B14F-4D97-AF65-F5344CB8AC3E}">
@@ -24320,8 +24319,9 @@
             </a:r>
             <a:r>
               <a:rPr lang="en-US" dirty="0" smtClean="0"/>
-              <a:t>)</a:t>
+              <a:t>) with ease of use (such as Uber)</a:t>
             </a:r>
+            <a:endParaRPr lang="en-US" dirty="0" smtClean="0"/>
           </a:p>
           <a:p>
             <a:r>

</xml_diff>

<commit_message>
Edited presentation to reflect new name
</commit_message>
<xml_diff>
--- a/Presentation/Spiral1.pptx
+++ b/Presentation/Spiral1.pptx
@@ -181,7 +181,7 @@
           <a:noFill/>
           <a:extLst>
             <a:ext uri="{909E8E84-426E-40dd-AFC4-6F175D3DCCD1}">
-              <a14:hiddenFill xmlns="" xmlns:a14="http://schemas.microsoft.com/office/drawing/2010/main">
+              <a14:hiddenFill xmlns:a14="http://schemas.microsoft.com/office/drawing/2010/main" xmlns="">
                 <a:solidFill>
                   <a:srgbClr val="FFFFFF"/>
                 </a:solidFill>
@@ -241,7 +241,7 @@
             </a:ln>
             <a:extLst>
               <a:ext uri="{91240B29-F687-4f45-9708-019B960494DF}">
-                <a14:hiddenLine xmlns="" xmlns:a14="http://schemas.microsoft.com/office/drawing/2010/main" w="9525">
+                <a14:hiddenLine xmlns:a14="http://schemas.microsoft.com/office/drawing/2010/main" xmlns="" w="9525">
                   <a:solidFill>
                     <a:srgbClr val="000000"/>
                   </a:solidFill>
@@ -331,7 +331,7 @@
             </a:ln>
             <a:extLst>
               <a:ext uri="{91240B29-F687-4f45-9708-019B960494DF}">
-                <a14:hiddenLine xmlns="" xmlns:a14="http://schemas.microsoft.com/office/drawing/2010/main" w="9525">
+                <a14:hiddenLine xmlns:a14="http://schemas.microsoft.com/office/drawing/2010/main" xmlns="" w="9525">
                   <a:solidFill>
                     <a:srgbClr val="000000"/>
                   </a:solidFill>
@@ -421,7 +421,7 @@
             </a:ln>
             <a:extLst>
               <a:ext uri="{91240B29-F687-4f45-9708-019B960494DF}">
-                <a14:hiddenLine xmlns="" xmlns:a14="http://schemas.microsoft.com/office/drawing/2010/main" w="9525">
+                <a14:hiddenLine xmlns:a14="http://schemas.microsoft.com/office/drawing/2010/main" xmlns="" w="9525">
                   <a:solidFill>
                     <a:srgbClr val="000000"/>
                   </a:solidFill>
@@ -455,7 +455,7 @@
             </a:ln>
             <a:extLst>
               <a:ext uri="{91240B29-F687-4f45-9708-019B960494DF}">
-                <a14:hiddenLine xmlns="" xmlns:a14="http://schemas.microsoft.com/office/drawing/2010/main" w="9525">
+                <a14:hiddenLine xmlns:a14="http://schemas.microsoft.com/office/drawing/2010/main" xmlns="" w="9525">
                   <a:solidFill>
                     <a:srgbClr val="000000"/>
                   </a:solidFill>
@@ -545,7 +545,7 @@
             </a:ln>
             <a:extLst>
               <a:ext uri="{91240B29-F687-4f45-9708-019B960494DF}">
-                <a14:hiddenLine xmlns="" xmlns:a14="http://schemas.microsoft.com/office/drawing/2010/main" w="9525">
+                <a14:hiddenLine xmlns:a14="http://schemas.microsoft.com/office/drawing/2010/main" xmlns="" w="9525">
                   <a:solidFill>
                     <a:srgbClr val="000000"/>
                   </a:solidFill>
@@ -607,7 +607,7 @@
             </a:ln>
             <a:extLst>
               <a:ext uri="{91240B29-F687-4f45-9708-019B960494DF}">
-                <a14:hiddenLine xmlns="" xmlns:a14="http://schemas.microsoft.com/office/drawing/2010/main" w="9525">
+                <a14:hiddenLine xmlns:a14="http://schemas.microsoft.com/office/drawing/2010/main" xmlns="" w="9525">
                   <a:solidFill>
                     <a:srgbClr val="000000"/>
                   </a:solidFill>
@@ -669,7 +669,7 @@
             </a:ln>
             <a:extLst>
               <a:ext uri="{91240B29-F687-4f45-9708-019B960494DF}">
-                <a14:hiddenLine xmlns="" xmlns:a14="http://schemas.microsoft.com/office/drawing/2010/main" w="9525">
+                <a14:hiddenLine xmlns:a14="http://schemas.microsoft.com/office/drawing/2010/main" xmlns="" w="9525">
                   <a:solidFill>
                     <a:srgbClr val="000000"/>
                   </a:solidFill>
@@ -759,7 +759,7 @@
             </a:ln>
             <a:extLst>
               <a:ext uri="{91240B29-F687-4f45-9708-019B960494DF}">
-                <a14:hiddenLine xmlns="" xmlns:a14="http://schemas.microsoft.com/office/drawing/2010/main" w="9525">
+                <a14:hiddenLine xmlns:a14="http://schemas.microsoft.com/office/drawing/2010/main" xmlns="" w="9525">
                   <a:solidFill>
                     <a:srgbClr val="000000"/>
                   </a:solidFill>
@@ -821,7 +821,7 @@
             </a:ln>
             <a:extLst>
               <a:ext uri="{91240B29-F687-4f45-9708-019B960494DF}">
-                <a14:hiddenLine xmlns="" xmlns:a14="http://schemas.microsoft.com/office/drawing/2010/main" w="9525">
+                <a14:hiddenLine xmlns:a14="http://schemas.microsoft.com/office/drawing/2010/main" xmlns="" w="9525">
                   <a:solidFill>
                     <a:srgbClr val="000000"/>
                   </a:solidFill>
@@ -883,7 +883,7 @@
             </a:ln>
             <a:extLst>
               <a:ext uri="{91240B29-F687-4f45-9708-019B960494DF}">
-                <a14:hiddenLine xmlns="" xmlns:a14="http://schemas.microsoft.com/office/drawing/2010/main" w="9525">
+                <a14:hiddenLine xmlns:a14="http://schemas.microsoft.com/office/drawing/2010/main" xmlns="" w="9525">
                   <a:solidFill>
                     <a:srgbClr val="000000"/>
                   </a:solidFill>
@@ -973,7 +973,7 @@
             </a:ln>
             <a:extLst>
               <a:ext uri="{91240B29-F687-4f45-9708-019B960494DF}">
-                <a14:hiddenLine xmlns="" xmlns:a14="http://schemas.microsoft.com/office/drawing/2010/main" w="9525">
+                <a14:hiddenLine xmlns:a14="http://schemas.microsoft.com/office/drawing/2010/main" xmlns="" w="9525">
                   <a:solidFill>
                     <a:srgbClr val="000000"/>
                   </a:solidFill>
@@ -1063,7 +1063,7 @@
             </a:ln>
             <a:extLst>
               <a:ext uri="{91240B29-F687-4f45-9708-019B960494DF}">
-                <a14:hiddenLine xmlns="" xmlns:a14="http://schemas.microsoft.com/office/drawing/2010/main" w="9525">
+                <a14:hiddenLine xmlns:a14="http://schemas.microsoft.com/office/drawing/2010/main" xmlns="" w="9525">
                   <a:solidFill>
                     <a:srgbClr val="000000"/>
                   </a:solidFill>
@@ -1125,7 +1125,7 @@
             </a:ln>
             <a:extLst>
               <a:ext uri="{91240B29-F687-4f45-9708-019B960494DF}">
-                <a14:hiddenLine xmlns="" xmlns:a14="http://schemas.microsoft.com/office/drawing/2010/main" w="9525">
+                <a14:hiddenLine xmlns:a14="http://schemas.microsoft.com/office/drawing/2010/main" xmlns="" w="9525">
                   <a:solidFill>
                     <a:srgbClr val="000000"/>
                   </a:solidFill>
@@ -1235,7 +1235,7 @@
             </a:ln>
             <a:extLst>
               <a:ext uri="{91240B29-F687-4f45-9708-019B960494DF}">
-                <a14:hiddenLine xmlns="" xmlns:a14="http://schemas.microsoft.com/office/drawing/2010/main" w="9525">
+                <a14:hiddenLine xmlns:a14="http://schemas.microsoft.com/office/drawing/2010/main" xmlns="" w="9525">
                   <a:solidFill>
                     <a:srgbClr val="000000"/>
                   </a:solidFill>
@@ -1297,7 +1297,7 @@
             </a:ln>
             <a:extLst>
               <a:ext uri="{91240B29-F687-4f45-9708-019B960494DF}">
-                <a14:hiddenLine xmlns="" xmlns:a14="http://schemas.microsoft.com/office/drawing/2010/main" w="9525">
+                <a14:hiddenLine xmlns:a14="http://schemas.microsoft.com/office/drawing/2010/main" xmlns="" w="9525">
                   <a:solidFill>
                     <a:srgbClr val="000000"/>
                   </a:solidFill>
@@ -1387,7 +1387,7 @@
             </a:ln>
             <a:extLst>
               <a:ext uri="{91240B29-F687-4f45-9708-019B960494DF}">
-                <a14:hiddenLine xmlns="" xmlns:a14="http://schemas.microsoft.com/office/drawing/2010/main" w="9525">
+                <a14:hiddenLine xmlns:a14="http://schemas.microsoft.com/office/drawing/2010/main" xmlns="" w="9525">
                   <a:solidFill>
                     <a:srgbClr val="000000"/>
                   </a:solidFill>
@@ -1477,7 +1477,7 @@
             </a:ln>
             <a:extLst>
               <a:ext uri="{91240B29-F687-4f45-9708-019B960494DF}">
-                <a14:hiddenLine xmlns="" xmlns:a14="http://schemas.microsoft.com/office/drawing/2010/main" w="9525">
+                <a14:hiddenLine xmlns:a14="http://schemas.microsoft.com/office/drawing/2010/main" xmlns="" w="9525">
                   <a:solidFill>
                     <a:srgbClr val="000000"/>
                   </a:solidFill>
@@ -1539,7 +1539,7 @@
             </a:ln>
             <a:extLst>
               <a:ext uri="{91240B29-F687-4f45-9708-019B960494DF}">
-                <a14:hiddenLine xmlns="" xmlns:a14="http://schemas.microsoft.com/office/drawing/2010/main" w="9525">
+                <a14:hiddenLine xmlns:a14="http://schemas.microsoft.com/office/drawing/2010/main" xmlns="" w="9525">
                   <a:solidFill>
                     <a:srgbClr val="000000"/>
                   </a:solidFill>
@@ -1629,7 +1629,7 @@
             </a:ln>
             <a:extLst>
               <a:ext uri="{91240B29-F687-4f45-9708-019B960494DF}">
-                <a14:hiddenLine xmlns="" xmlns:a14="http://schemas.microsoft.com/office/drawing/2010/main" w="9525">
+                <a14:hiddenLine xmlns:a14="http://schemas.microsoft.com/office/drawing/2010/main" xmlns="" w="9525">
                   <a:solidFill>
                     <a:srgbClr val="000000"/>
                   </a:solidFill>
@@ -1719,7 +1719,7 @@
             </a:ln>
             <a:extLst>
               <a:ext uri="{91240B29-F687-4f45-9708-019B960494DF}">
-                <a14:hiddenLine xmlns="" xmlns:a14="http://schemas.microsoft.com/office/drawing/2010/main" w="9525">
+                <a14:hiddenLine xmlns:a14="http://schemas.microsoft.com/office/drawing/2010/main" xmlns="" w="9525">
                   <a:solidFill>
                     <a:srgbClr val="000000"/>
                   </a:solidFill>
@@ -1775,7 +1775,7 @@
             </a:ln>
             <a:extLst>
               <a:ext uri="{91240B29-F687-4f45-9708-019B960494DF}">
-                <a14:hiddenLine xmlns="" xmlns:a14="http://schemas.microsoft.com/office/drawing/2010/main" w="9525">
+                <a14:hiddenLine xmlns:a14="http://schemas.microsoft.com/office/drawing/2010/main" xmlns="" w="9525">
                   <a:solidFill>
                     <a:srgbClr val="000000"/>
                   </a:solidFill>
@@ -1865,7 +1865,7 @@
             </a:ln>
             <a:extLst>
               <a:ext uri="{91240B29-F687-4f45-9708-019B960494DF}">
-                <a14:hiddenLine xmlns="" xmlns:a14="http://schemas.microsoft.com/office/drawing/2010/main" w="9525">
+                <a14:hiddenLine xmlns:a14="http://schemas.microsoft.com/office/drawing/2010/main" xmlns="" w="9525">
                   <a:solidFill>
                     <a:srgbClr val="000000"/>
                   </a:solidFill>
@@ -1921,7 +1921,7 @@
             </a:ln>
             <a:extLst>
               <a:ext uri="{91240B29-F687-4f45-9708-019B960494DF}">
-                <a14:hiddenLine xmlns="" xmlns:a14="http://schemas.microsoft.com/office/drawing/2010/main" w="9525">
+                <a14:hiddenLine xmlns:a14="http://schemas.microsoft.com/office/drawing/2010/main" xmlns="" w="9525">
                   <a:solidFill>
                     <a:srgbClr val="000000"/>
                   </a:solidFill>
@@ -2011,7 +2011,7 @@
             </a:ln>
             <a:extLst>
               <a:ext uri="{91240B29-F687-4f45-9708-019B960494DF}">
-                <a14:hiddenLine xmlns="" xmlns:a14="http://schemas.microsoft.com/office/drawing/2010/main" w="9525">
+                <a14:hiddenLine xmlns:a14="http://schemas.microsoft.com/office/drawing/2010/main" xmlns="" w="9525">
                   <a:solidFill>
                     <a:srgbClr val="000000"/>
                   </a:solidFill>
@@ -2079,7 +2079,7 @@
             </a:ln>
             <a:extLst>
               <a:ext uri="{91240B29-F687-4f45-9708-019B960494DF}">
-                <a14:hiddenLine xmlns="" xmlns:a14="http://schemas.microsoft.com/office/drawing/2010/main" w="9525">
+                <a14:hiddenLine xmlns:a14="http://schemas.microsoft.com/office/drawing/2010/main" xmlns="" w="9525">
                   <a:solidFill>
                     <a:srgbClr val="000000"/>
                   </a:solidFill>
@@ -2169,7 +2169,7 @@
             </a:ln>
             <a:extLst>
               <a:ext uri="{91240B29-F687-4f45-9708-019B960494DF}">
-                <a14:hiddenLine xmlns="" xmlns:a14="http://schemas.microsoft.com/office/drawing/2010/main" w="9525">
+                <a14:hiddenLine xmlns:a14="http://schemas.microsoft.com/office/drawing/2010/main" xmlns="" w="9525">
                   <a:solidFill>
                     <a:srgbClr val="000000"/>
                   </a:solidFill>
@@ -2237,7 +2237,7 @@
             </a:ln>
             <a:extLst>
               <a:ext uri="{91240B29-F687-4f45-9708-019B960494DF}">
-                <a14:hiddenLine xmlns="" xmlns:a14="http://schemas.microsoft.com/office/drawing/2010/main" w="9525">
+                <a14:hiddenLine xmlns:a14="http://schemas.microsoft.com/office/drawing/2010/main" xmlns="" w="9525">
                   <a:solidFill>
                     <a:srgbClr val="000000"/>
                   </a:solidFill>
@@ -2327,7 +2327,7 @@
             </a:ln>
             <a:extLst>
               <a:ext uri="{91240B29-F687-4f45-9708-019B960494DF}">
-                <a14:hiddenLine xmlns="" xmlns:a14="http://schemas.microsoft.com/office/drawing/2010/main" w="9525">
+                <a14:hiddenLine xmlns:a14="http://schemas.microsoft.com/office/drawing/2010/main" xmlns="" w="9525">
                   <a:solidFill>
                     <a:srgbClr val="000000"/>
                   </a:solidFill>
@@ -2361,7 +2361,7 @@
             </a:ln>
             <a:extLst>
               <a:ext uri="{91240B29-F687-4f45-9708-019B960494DF}">
-                <a14:hiddenLine xmlns="" xmlns:a14="http://schemas.microsoft.com/office/drawing/2010/main" w="9525">
+                <a14:hiddenLine xmlns:a14="http://schemas.microsoft.com/office/drawing/2010/main" xmlns="" w="9525">
                   <a:solidFill>
                     <a:srgbClr val="000000"/>
                   </a:solidFill>
@@ -2451,7 +2451,7 @@
             </a:ln>
             <a:extLst>
               <a:ext uri="{91240B29-F687-4f45-9708-019B960494DF}">
-                <a14:hiddenLine xmlns="" xmlns:a14="http://schemas.microsoft.com/office/drawing/2010/main" w="9525">
+                <a14:hiddenLine xmlns:a14="http://schemas.microsoft.com/office/drawing/2010/main" xmlns="" w="9525">
                   <a:solidFill>
                     <a:srgbClr val="000000"/>
                   </a:solidFill>
@@ -2513,7 +2513,7 @@
             </a:ln>
             <a:extLst>
               <a:ext uri="{91240B29-F687-4f45-9708-019B960494DF}">
-                <a14:hiddenLine xmlns="" xmlns:a14="http://schemas.microsoft.com/office/drawing/2010/main" w="9525">
+                <a14:hiddenLine xmlns:a14="http://schemas.microsoft.com/office/drawing/2010/main" xmlns="" w="9525">
                   <a:solidFill>
                     <a:srgbClr val="000000"/>
                   </a:solidFill>
@@ -2575,7 +2575,7 @@
             </a:ln>
             <a:extLst>
               <a:ext uri="{91240B29-F687-4f45-9708-019B960494DF}">
-                <a14:hiddenLine xmlns="" xmlns:a14="http://schemas.microsoft.com/office/drawing/2010/main" w="9525">
+                <a14:hiddenLine xmlns:a14="http://schemas.microsoft.com/office/drawing/2010/main" xmlns="" w="9525">
                   <a:solidFill>
                     <a:srgbClr val="000000"/>
                   </a:solidFill>
@@ -2665,7 +2665,7 @@
             </a:ln>
             <a:extLst>
               <a:ext uri="{91240B29-F687-4f45-9708-019B960494DF}">
-                <a14:hiddenLine xmlns="" xmlns:a14="http://schemas.microsoft.com/office/drawing/2010/main" w="9525">
+                <a14:hiddenLine xmlns:a14="http://schemas.microsoft.com/office/drawing/2010/main" xmlns="" w="9525">
                   <a:solidFill>
                     <a:srgbClr val="000000"/>
                   </a:solidFill>
@@ -2733,7 +2733,7 @@
             </a:ln>
             <a:extLst>
               <a:ext uri="{91240B29-F687-4f45-9708-019B960494DF}">
-                <a14:hiddenLine xmlns="" xmlns:a14="http://schemas.microsoft.com/office/drawing/2010/main" w="9525">
+                <a14:hiddenLine xmlns:a14="http://schemas.microsoft.com/office/drawing/2010/main" xmlns="" w="9525">
                   <a:solidFill>
                     <a:srgbClr val="000000"/>
                   </a:solidFill>
@@ -2795,7 +2795,7 @@
             </a:ln>
             <a:extLst>
               <a:ext uri="{91240B29-F687-4f45-9708-019B960494DF}">
-                <a14:hiddenLine xmlns="" xmlns:a14="http://schemas.microsoft.com/office/drawing/2010/main" w="9525">
+                <a14:hiddenLine xmlns:a14="http://schemas.microsoft.com/office/drawing/2010/main" xmlns="" w="9525">
                   <a:solidFill>
                     <a:srgbClr val="000000"/>
                   </a:solidFill>
@@ -2885,7 +2885,7 @@
             </a:ln>
             <a:extLst>
               <a:ext uri="{91240B29-F687-4f45-9708-019B960494DF}">
-                <a14:hiddenLine xmlns="" xmlns:a14="http://schemas.microsoft.com/office/drawing/2010/main" w="9525">
+                <a14:hiddenLine xmlns:a14="http://schemas.microsoft.com/office/drawing/2010/main" xmlns="" w="9525">
                   <a:solidFill>
                     <a:srgbClr val="000000"/>
                   </a:solidFill>
@@ -2947,7 +2947,7 @@
             </a:ln>
             <a:extLst>
               <a:ext uri="{91240B29-F687-4f45-9708-019B960494DF}">
-                <a14:hiddenLine xmlns="" xmlns:a14="http://schemas.microsoft.com/office/drawing/2010/main" w="9525">
+                <a14:hiddenLine xmlns:a14="http://schemas.microsoft.com/office/drawing/2010/main" xmlns="" w="9525">
                   <a:solidFill>
                     <a:srgbClr val="000000"/>
                   </a:solidFill>
@@ -3037,7 +3037,7 @@
             </a:ln>
             <a:extLst>
               <a:ext uri="{91240B29-F687-4f45-9708-019B960494DF}">
-                <a14:hiddenLine xmlns="" xmlns:a14="http://schemas.microsoft.com/office/drawing/2010/main" w="9525">
+                <a14:hiddenLine xmlns:a14="http://schemas.microsoft.com/office/drawing/2010/main" xmlns="" w="9525">
                   <a:solidFill>
                     <a:srgbClr val="000000"/>
                   </a:solidFill>
@@ -3099,7 +3099,7 @@
             </a:ln>
             <a:extLst>
               <a:ext uri="{91240B29-F687-4f45-9708-019B960494DF}">
-                <a14:hiddenLine xmlns="" xmlns:a14="http://schemas.microsoft.com/office/drawing/2010/main" w="9525">
+                <a14:hiddenLine xmlns:a14="http://schemas.microsoft.com/office/drawing/2010/main" xmlns="" w="9525">
                   <a:solidFill>
                     <a:srgbClr val="000000"/>
                   </a:solidFill>
@@ -3189,7 +3189,7 @@
             </a:ln>
             <a:extLst>
               <a:ext uri="{91240B29-F687-4f45-9708-019B960494DF}">
-                <a14:hiddenLine xmlns="" xmlns:a14="http://schemas.microsoft.com/office/drawing/2010/main" w="9525">
+                <a14:hiddenLine xmlns:a14="http://schemas.microsoft.com/office/drawing/2010/main" xmlns="" w="9525">
                   <a:solidFill>
                     <a:srgbClr val="000000"/>
                   </a:solidFill>
@@ -3223,7 +3223,7 @@
             </a:ln>
             <a:extLst>
               <a:ext uri="{91240B29-F687-4f45-9708-019B960494DF}">
-                <a14:hiddenLine xmlns="" xmlns:a14="http://schemas.microsoft.com/office/drawing/2010/main" w="9525">
+                <a14:hiddenLine xmlns:a14="http://schemas.microsoft.com/office/drawing/2010/main" xmlns="" w="9525">
                   <a:solidFill>
                     <a:srgbClr val="000000"/>
                   </a:solidFill>
@@ -3288,7 +3288,7 @@
             </a:ln>
             <a:extLst>
               <a:ext uri="{91240B29-F687-4f45-9708-019B960494DF}">
-                <a14:hiddenLine xmlns="" xmlns:a14="http://schemas.microsoft.com/office/drawing/2010/main" w="9525">
+                <a14:hiddenLine xmlns:a14="http://schemas.microsoft.com/office/drawing/2010/main" xmlns="" w="9525">
                   <a:solidFill>
                     <a:srgbClr val="000000"/>
                   </a:solidFill>
@@ -3378,7 +3378,7 @@
             </a:ln>
             <a:extLst>
               <a:ext uri="{91240B29-F687-4f45-9708-019B960494DF}">
-                <a14:hiddenLine xmlns="" xmlns:a14="http://schemas.microsoft.com/office/drawing/2010/main" w="9525">
+                <a14:hiddenLine xmlns:a14="http://schemas.microsoft.com/office/drawing/2010/main" xmlns="" w="9525">
                   <a:solidFill>
                     <a:srgbClr val="000000"/>
                   </a:solidFill>
@@ -3440,7 +3440,7 @@
             </a:ln>
             <a:extLst>
               <a:ext uri="{91240B29-F687-4f45-9708-019B960494DF}">
-                <a14:hiddenLine xmlns="" xmlns:a14="http://schemas.microsoft.com/office/drawing/2010/main" w="9525">
+                <a14:hiddenLine xmlns:a14="http://schemas.microsoft.com/office/drawing/2010/main" xmlns="" w="9525">
                   <a:solidFill>
                     <a:srgbClr val="000000"/>
                   </a:solidFill>
@@ -3530,7 +3530,7 @@
             </a:ln>
             <a:extLst>
               <a:ext uri="{91240B29-F687-4f45-9708-019B960494DF}">
-                <a14:hiddenLine xmlns="" xmlns:a14="http://schemas.microsoft.com/office/drawing/2010/main" w="9525">
+                <a14:hiddenLine xmlns:a14="http://schemas.microsoft.com/office/drawing/2010/main" xmlns="" w="9525">
                   <a:solidFill>
                     <a:srgbClr val="000000"/>
                   </a:solidFill>
@@ -3620,7 +3620,7 @@
             </a:ln>
             <a:extLst>
               <a:ext uri="{91240B29-F687-4f45-9708-019B960494DF}">
-                <a14:hiddenLine xmlns="" xmlns:a14="http://schemas.microsoft.com/office/drawing/2010/main" w="9525">
+                <a14:hiddenLine xmlns:a14="http://schemas.microsoft.com/office/drawing/2010/main" xmlns="" w="9525">
                   <a:solidFill>
                     <a:srgbClr val="000000"/>
                   </a:solidFill>
@@ -3685,7 +3685,7 @@
             </a:ln>
             <a:extLst>
               <a:ext uri="{91240B29-F687-4f45-9708-019B960494DF}">
-                <a14:hiddenLine xmlns="" xmlns:a14="http://schemas.microsoft.com/office/drawing/2010/main" w="9525">
+                <a14:hiddenLine xmlns:a14="http://schemas.microsoft.com/office/drawing/2010/main" xmlns="" w="9525">
                   <a:solidFill>
                     <a:srgbClr val="000000"/>
                   </a:solidFill>
@@ -3747,7 +3747,7 @@
             </a:ln>
             <a:extLst>
               <a:ext uri="{91240B29-F687-4f45-9708-019B960494DF}">
-                <a14:hiddenLine xmlns="" xmlns:a14="http://schemas.microsoft.com/office/drawing/2010/main" w="9525">
+                <a14:hiddenLine xmlns:a14="http://schemas.microsoft.com/office/drawing/2010/main" xmlns="" w="9525">
                   <a:solidFill>
                     <a:srgbClr val="000000"/>
                   </a:solidFill>
@@ -3837,7 +3837,7 @@
             </a:ln>
             <a:extLst>
               <a:ext uri="{91240B29-F687-4f45-9708-019B960494DF}">
-                <a14:hiddenLine xmlns="" xmlns:a14="http://schemas.microsoft.com/office/drawing/2010/main" w="9525">
+                <a14:hiddenLine xmlns:a14="http://schemas.microsoft.com/office/drawing/2010/main" xmlns="" w="9525">
                   <a:solidFill>
                     <a:srgbClr val="000000"/>
                   </a:solidFill>
@@ -3927,7 +3927,7 @@
             </a:ln>
             <a:extLst>
               <a:ext uri="{91240B29-F687-4f45-9708-019B960494DF}">
-                <a14:hiddenLine xmlns="" xmlns:a14="http://schemas.microsoft.com/office/drawing/2010/main" w="9525">
+                <a14:hiddenLine xmlns:a14="http://schemas.microsoft.com/office/drawing/2010/main" xmlns="" w="9525">
                   <a:solidFill>
                     <a:srgbClr val="000000"/>
                   </a:solidFill>
@@ -3989,7 +3989,7 @@
             </a:ln>
             <a:extLst>
               <a:ext uri="{91240B29-F687-4f45-9708-019B960494DF}">
-                <a14:hiddenLine xmlns="" xmlns:a14="http://schemas.microsoft.com/office/drawing/2010/main" w="9525">
+                <a14:hiddenLine xmlns:a14="http://schemas.microsoft.com/office/drawing/2010/main" xmlns="" w="9525">
                   <a:solidFill>
                     <a:srgbClr val="000000"/>
                   </a:solidFill>
@@ -4109,7 +4109,7 @@
             </a:ln>
             <a:extLst>
               <a:ext uri="{91240B29-F687-4f45-9708-019B960494DF}">
-                <a14:hiddenLine xmlns="" xmlns:a14="http://schemas.microsoft.com/office/drawing/2010/main" w="9525">
+                <a14:hiddenLine xmlns:a14="http://schemas.microsoft.com/office/drawing/2010/main" xmlns="" w="9525">
                   <a:solidFill>
                     <a:srgbClr val="000000"/>
                   </a:solidFill>
@@ -4177,7 +4177,7 @@
             </a:ln>
             <a:extLst>
               <a:ext uri="{91240B29-F687-4f45-9708-019B960494DF}">
-                <a14:hiddenLine xmlns="" xmlns:a14="http://schemas.microsoft.com/office/drawing/2010/main" w="9525">
+                <a14:hiddenLine xmlns:a14="http://schemas.microsoft.com/office/drawing/2010/main" xmlns="" w="9525">
                   <a:solidFill>
                     <a:srgbClr val="000000"/>
                   </a:solidFill>
@@ -4267,7 +4267,7 @@
             </a:ln>
             <a:extLst>
               <a:ext uri="{91240B29-F687-4f45-9708-019B960494DF}">
-                <a14:hiddenLine xmlns="" xmlns:a14="http://schemas.microsoft.com/office/drawing/2010/main" w="9525">
+                <a14:hiddenLine xmlns:a14="http://schemas.microsoft.com/office/drawing/2010/main" xmlns="" w="9525">
                   <a:solidFill>
                     <a:srgbClr val="000000"/>
                   </a:solidFill>
@@ -8989,7 +8989,7 @@
           <a:noFill/>
           <a:extLst>
             <a:ext uri="{909E8E84-426E-40dd-AFC4-6F175D3DCCD1}">
-              <a14:hiddenFill xmlns="" xmlns:a14="http://schemas.microsoft.com/office/drawing/2010/main">
+              <a14:hiddenFill xmlns:a14="http://schemas.microsoft.com/office/drawing/2010/main" xmlns="">
                 <a:solidFill>
                   <a:srgbClr val="FFFFFF"/>
                 </a:solidFill>
@@ -9063,7 +9063,7 @@
               </a:ln>
               <a:extLst>
                 <a:ext uri="{91240B29-F687-4f45-9708-019B960494DF}">
-                  <a14:hiddenLine xmlns="" xmlns:a14="http://schemas.microsoft.com/office/drawing/2010/main" w="9525">
+                  <a14:hiddenLine xmlns:a14="http://schemas.microsoft.com/office/drawing/2010/main" xmlns="" w="9525">
                     <a:solidFill>
                       <a:srgbClr val="000000"/>
                     </a:solidFill>
@@ -9153,7 +9153,7 @@
               </a:ln>
               <a:extLst>
                 <a:ext uri="{91240B29-F687-4f45-9708-019B960494DF}">
-                  <a14:hiddenLine xmlns="" xmlns:a14="http://schemas.microsoft.com/office/drawing/2010/main" w="9525">
+                  <a14:hiddenLine xmlns:a14="http://schemas.microsoft.com/office/drawing/2010/main" xmlns="" w="9525">
                     <a:solidFill>
                       <a:srgbClr val="000000"/>
                     </a:solidFill>
@@ -9243,7 +9243,7 @@
               </a:ln>
               <a:extLst>
                 <a:ext uri="{91240B29-F687-4f45-9708-019B960494DF}">
-                  <a14:hiddenLine xmlns="" xmlns:a14="http://schemas.microsoft.com/office/drawing/2010/main" w="9525">
+                  <a14:hiddenLine xmlns:a14="http://schemas.microsoft.com/office/drawing/2010/main" xmlns="" w="9525">
                     <a:solidFill>
                       <a:srgbClr val="000000"/>
                     </a:solidFill>
@@ -9305,7 +9305,7 @@
               </a:ln>
               <a:extLst>
                 <a:ext uri="{91240B29-F687-4f45-9708-019B960494DF}">
-                  <a14:hiddenLine xmlns="" xmlns:a14="http://schemas.microsoft.com/office/drawing/2010/main" w="9525">
+                  <a14:hiddenLine xmlns:a14="http://schemas.microsoft.com/office/drawing/2010/main" xmlns="" w="9525">
                     <a:solidFill>
                       <a:srgbClr val="000000"/>
                     </a:solidFill>
@@ -9395,7 +9395,7 @@
               </a:ln>
               <a:extLst>
                 <a:ext uri="{91240B29-F687-4f45-9708-019B960494DF}">
-                  <a14:hiddenLine xmlns="" xmlns:a14="http://schemas.microsoft.com/office/drawing/2010/main" w="9525">
+                  <a14:hiddenLine xmlns:a14="http://schemas.microsoft.com/office/drawing/2010/main" xmlns="" w="9525">
                     <a:solidFill>
                       <a:srgbClr val="000000"/>
                     </a:solidFill>
@@ -9457,7 +9457,7 @@
               </a:ln>
               <a:extLst>
                 <a:ext uri="{91240B29-F687-4f45-9708-019B960494DF}">
-                  <a14:hiddenLine xmlns="" xmlns:a14="http://schemas.microsoft.com/office/drawing/2010/main" w="9525">
+                  <a14:hiddenLine xmlns:a14="http://schemas.microsoft.com/office/drawing/2010/main" xmlns="" w="9525">
                     <a:solidFill>
                       <a:srgbClr val="000000"/>
                     </a:solidFill>
@@ -9519,7 +9519,7 @@
               </a:ln>
               <a:extLst>
                 <a:ext uri="{91240B29-F687-4f45-9708-019B960494DF}">
-                  <a14:hiddenLine xmlns="" xmlns:a14="http://schemas.microsoft.com/office/drawing/2010/main" w="9525">
+                  <a14:hiddenLine xmlns:a14="http://schemas.microsoft.com/office/drawing/2010/main" xmlns="" w="9525">
                     <a:solidFill>
                       <a:srgbClr val="000000"/>
                     </a:solidFill>
@@ -9609,7 +9609,7 @@
               </a:ln>
               <a:extLst>
                 <a:ext uri="{91240B29-F687-4f45-9708-019B960494DF}">
-                  <a14:hiddenLine xmlns="" xmlns:a14="http://schemas.microsoft.com/office/drawing/2010/main" w="9525">
+                  <a14:hiddenLine xmlns:a14="http://schemas.microsoft.com/office/drawing/2010/main" xmlns="" w="9525">
                     <a:solidFill>
                       <a:srgbClr val="000000"/>
                     </a:solidFill>
@@ -9699,7 +9699,7 @@
               </a:ln>
               <a:extLst>
                 <a:ext uri="{91240B29-F687-4f45-9708-019B960494DF}">
-                  <a14:hiddenLine xmlns="" xmlns:a14="http://schemas.microsoft.com/office/drawing/2010/main" w="9525">
+                  <a14:hiddenLine xmlns:a14="http://schemas.microsoft.com/office/drawing/2010/main" xmlns="" w="9525">
                     <a:solidFill>
                       <a:srgbClr val="000000"/>
                     </a:solidFill>
@@ -9761,7 +9761,7 @@
               </a:ln>
               <a:extLst>
                 <a:ext uri="{91240B29-F687-4f45-9708-019B960494DF}">
-                  <a14:hiddenLine xmlns="" xmlns:a14="http://schemas.microsoft.com/office/drawing/2010/main" w="9525">
+                  <a14:hiddenLine xmlns:a14="http://schemas.microsoft.com/office/drawing/2010/main" xmlns="" w="9525">
                     <a:solidFill>
                       <a:srgbClr val="000000"/>
                     </a:solidFill>
@@ -9871,7 +9871,7 @@
               </a:ln>
               <a:extLst>
                 <a:ext uri="{91240B29-F687-4f45-9708-019B960494DF}">
-                  <a14:hiddenLine xmlns="" xmlns:a14="http://schemas.microsoft.com/office/drawing/2010/main" w="9525">
+                  <a14:hiddenLine xmlns:a14="http://schemas.microsoft.com/office/drawing/2010/main" xmlns="" w="9525">
                     <a:solidFill>
                       <a:srgbClr val="000000"/>
                     </a:solidFill>
@@ -9955,7 +9955,7 @@
               </a:ln>
               <a:extLst>
                 <a:ext uri="{91240B29-F687-4f45-9708-019B960494DF}">
-                  <a14:hiddenLine xmlns="" xmlns:a14="http://schemas.microsoft.com/office/drawing/2010/main" w="9525">
+                  <a14:hiddenLine xmlns:a14="http://schemas.microsoft.com/office/drawing/2010/main" xmlns="" w="9525">
                     <a:solidFill>
                       <a:srgbClr val="000000"/>
                     </a:solidFill>
@@ -10017,7 +10017,7 @@
               </a:ln>
               <a:extLst>
                 <a:ext uri="{91240B29-F687-4f45-9708-019B960494DF}">
-                  <a14:hiddenLine xmlns="" xmlns:a14="http://schemas.microsoft.com/office/drawing/2010/main" w="9525">
+                  <a14:hiddenLine xmlns:a14="http://schemas.microsoft.com/office/drawing/2010/main" xmlns="" w="9525">
                     <a:solidFill>
                       <a:srgbClr val="000000"/>
                     </a:solidFill>
@@ -10079,7 +10079,7 @@
               </a:ln>
               <a:extLst>
                 <a:ext uri="{91240B29-F687-4f45-9708-019B960494DF}">
-                  <a14:hiddenLine xmlns="" xmlns:a14="http://schemas.microsoft.com/office/drawing/2010/main" w="9525">
+                  <a14:hiddenLine xmlns:a14="http://schemas.microsoft.com/office/drawing/2010/main" xmlns="" w="9525">
                     <a:solidFill>
                       <a:srgbClr val="000000"/>
                     </a:solidFill>
@@ -10169,7 +10169,7 @@
               </a:ln>
               <a:extLst>
                 <a:ext uri="{91240B29-F687-4f45-9708-019B960494DF}">
-                  <a14:hiddenLine xmlns="" xmlns:a14="http://schemas.microsoft.com/office/drawing/2010/main" w="9525">
+                  <a14:hiddenLine xmlns:a14="http://schemas.microsoft.com/office/drawing/2010/main" xmlns="" w="9525">
                     <a:solidFill>
                       <a:srgbClr val="000000"/>
                     </a:solidFill>
@@ -10203,7 +10203,7 @@
               </a:ln>
               <a:extLst>
                 <a:ext uri="{91240B29-F687-4f45-9708-019B960494DF}">
-                  <a14:hiddenLine xmlns="" xmlns:a14="http://schemas.microsoft.com/office/drawing/2010/main" w="9525">
+                  <a14:hiddenLine xmlns:a14="http://schemas.microsoft.com/office/drawing/2010/main" xmlns="" w="9525">
                     <a:solidFill>
                       <a:srgbClr val="000000"/>
                     </a:solidFill>
@@ -10268,7 +10268,7 @@
               </a:ln>
               <a:extLst>
                 <a:ext uri="{91240B29-F687-4f45-9708-019B960494DF}">
-                  <a14:hiddenLine xmlns="" xmlns:a14="http://schemas.microsoft.com/office/drawing/2010/main" w="9525">
+                  <a14:hiddenLine xmlns:a14="http://schemas.microsoft.com/office/drawing/2010/main" xmlns="" w="9525">
                     <a:solidFill>
                       <a:srgbClr val="000000"/>
                     </a:solidFill>
@@ -10358,7 +10358,7 @@
               </a:ln>
               <a:extLst>
                 <a:ext uri="{91240B29-F687-4f45-9708-019B960494DF}">
-                  <a14:hiddenLine xmlns="" xmlns:a14="http://schemas.microsoft.com/office/drawing/2010/main" w="9525">
+                  <a14:hiddenLine xmlns:a14="http://schemas.microsoft.com/office/drawing/2010/main" xmlns="" w="9525">
                     <a:solidFill>
                       <a:srgbClr val="000000"/>
                     </a:solidFill>
@@ -10420,7 +10420,7 @@
               </a:ln>
               <a:extLst>
                 <a:ext uri="{91240B29-F687-4f45-9708-019B960494DF}">
-                  <a14:hiddenLine xmlns="" xmlns:a14="http://schemas.microsoft.com/office/drawing/2010/main" w="9525">
+                  <a14:hiddenLine xmlns:a14="http://schemas.microsoft.com/office/drawing/2010/main" xmlns="" w="9525">
                     <a:solidFill>
                       <a:srgbClr val="000000"/>
                     </a:solidFill>
@@ -10510,7 +10510,7 @@
               </a:ln>
               <a:extLst>
                 <a:ext uri="{91240B29-F687-4f45-9708-019B960494DF}">
-                  <a14:hiddenLine xmlns="" xmlns:a14="http://schemas.microsoft.com/office/drawing/2010/main" w="9525">
+                  <a14:hiddenLine xmlns:a14="http://schemas.microsoft.com/office/drawing/2010/main" xmlns="" w="9525">
                     <a:solidFill>
                       <a:srgbClr val="000000"/>
                     </a:solidFill>
@@ -10575,7 +10575,7 @@
               </a:ln>
               <a:extLst>
                 <a:ext uri="{91240B29-F687-4f45-9708-019B960494DF}">
-                  <a14:hiddenLine xmlns="" xmlns:a14="http://schemas.microsoft.com/office/drawing/2010/main" w="9525">
+                  <a14:hiddenLine xmlns:a14="http://schemas.microsoft.com/office/drawing/2010/main" xmlns="" w="9525">
                     <a:solidFill>
                       <a:srgbClr val="000000"/>
                     </a:solidFill>
@@ -10637,7 +10637,7 @@
               </a:ln>
               <a:extLst>
                 <a:ext uri="{91240B29-F687-4f45-9708-019B960494DF}">
-                  <a14:hiddenLine xmlns="" xmlns:a14="http://schemas.microsoft.com/office/drawing/2010/main" w="9525">
+                  <a14:hiddenLine xmlns:a14="http://schemas.microsoft.com/office/drawing/2010/main" xmlns="" w="9525">
                     <a:solidFill>
                       <a:srgbClr val="000000"/>
                     </a:solidFill>
@@ -10727,7 +10727,7 @@
               </a:ln>
               <a:extLst>
                 <a:ext uri="{91240B29-F687-4f45-9708-019B960494DF}">
-                  <a14:hiddenLine xmlns="" xmlns:a14="http://schemas.microsoft.com/office/drawing/2010/main" w="9525">
+                  <a14:hiddenLine xmlns:a14="http://schemas.microsoft.com/office/drawing/2010/main" xmlns="" w="9525">
                     <a:solidFill>
                       <a:srgbClr val="000000"/>
                     </a:solidFill>
@@ -10817,7 +10817,7 @@
               </a:ln>
               <a:extLst>
                 <a:ext uri="{91240B29-F687-4f45-9708-019B960494DF}">
-                  <a14:hiddenLine xmlns="" xmlns:a14="http://schemas.microsoft.com/office/drawing/2010/main" w="9525">
+                  <a14:hiddenLine xmlns:a14="http://schemas.microsoft.com/office/drawing/2010/main" xmlns="" w="9525">
                     <a:solidFill>
                       <a:srgbClr val="000000"/>
                     </a:solidFill>
@@ -10882,7 +10882,7 @@
               </a:ln>
               <a:extLst>
                 <a:ext uri="{91240B29-F687-4f45-9708-019B960494DF}">
-                  <a14:hiddenLine xmlns="" xmlns:a14="http://schemas.microsoft.com/office/drawing/2010/main" w="9525">
+                  <a14:hiddenLine xmlns:a14="http://schemas.microsoft.com/office/drawing/2010/main" xmlns="" w="9525">
                     <a:solidFill>
                       <a:srgbClr val="000000"/>
                     </a:solidFill>
@@ -11002,7 +11002,7 @@
               </a:ln>
               <a:extLst>
                 <a:ext uri="{91240B29-F687-4f45-9708-019B960494DF}">
-                  <a14:hiddenLine xmlns="" xmlns:a14="http://schemas.microsoft.com/office/drawing/2010/main" w="9525">
+                  <a14:hiddenLine xmlns:a14="http://schemas.microsoft.com/office/drawing/2010/main" xmlns="" w="9525">
                     <a:solidFill>
                       <a:srgbClr val="000000"/>
                     </a:solidFill>
@@ -11100,7 +11100,7 @@
               </a:ln>
               <a:extLst>
                 <a:ext uri="{91240B29-F687-4f45-9708-019B960494DF}">
-                  <a14:hiddenLine xmlns="" xmlns:a14="http://schemas.microsoft.com/office/drawing/2010/main" w="9525">
+                  <a14:hiddenLine xmlns:a14="http://schemas.microsoft.com/office/drawing/2010/main" xmlns="" w="9525">
                     <a:solidFill>
                       <a:srgbClr val="000000"/>
                     </a:solidFill>
@@ -11215,7 +11215,7 @@
               </a:ln>
               <a:extLst>
                 <a:ext uri="{91240B29-F687-4f45-9708-019B960494DF}">
-                  <a14:hiddenLine xmlns="" xmlns:a14="http://schemas.microsoft.com/office/drawing/2010/main" w="9525">
+                  <a14:hiddenLine xmlns:a14="http://schemas.microsoft.com/office/drawing/2010/main" xmlns="" w="9525">
                     <a:solidFill>
                       <a:srgbClr val="000000"/>
                     </a:solidFill>
@@ -11305,7 +11305,7 @@
               </a:ln>
               <a:extLst>
                 <a:ext uri="{91240B29-F687-4f45-9708-019B960494DF}">
-                  <a14:hiddenLine xmlns="" xmlns:a14="http://schemas.microsoft.com/office/drawing/2010/main" w="9525">
+                  <a14:hiddenLine xmlns:a14="http://schemas.microsoft.com/office/drawing/2010/main" xmlns="" w="9525">
                     <a:solidFill>
                       <a:srgbClr val="000000"/>
                     </a:solidFill>
@@ -11370,7 +11370,7 @@
               </a:ln>
               <a:extLst>
                 <a:ext uri="{91240B29-F687-4f45-9708-019B960494DF}">
-                  <a14:hiddenLine xmlns="" xmlns:a14="http://schemas.microsoft.com/office/drawing/2010/main" w="9525">
+                  <a14:hiddenLine xmlns:a14="http://schemas.microsoft.com/office/drawing/2010/main" xmlns="" w="9525">
                     <a:solidFill>
                       <a:srgbClr val="000000"/>
                     </a:solidFill>
@@ -11460,7 +11460,7 @@
               </a:ln>
               <a:extLst>
                 <a:ext uri="{91240B29-F687-4f45-9708-019B960494DF}">
-                  <a14:hiddenLine xmlns="" xmlns:a14="http://schemas.microsoft.com/office/drawing/2010/main" w="9525">
+                  <a14:hiddenLine xmlns:a14="http://schemas.microsoft.com/office/drawing/2010/main" xmlns="" w="9525">
                     <a:solidFill>
                       <a:srgbClr val="000000"/>
                     </a:solidFill>
@@ -11528,7 +11528,7 @@
               </a:ln>
               <a:extLst>
                 <a:ext uri="{91240B29-F687-4f45-9708-019B960494DF}">
-                  <a14:hiddenLine xmlns="" xmlns:a14="http://schemas.microsoft.com/office/drawing/2010/main" w="9525">
+                  <a14:hiddenLine xmlns:a14="http://schemas.microsoft.com/office/drawing/2010/main" xmlns="" w="9525">
                     <a:solidFill>
                       <a:srgbClr val="000000"/>
                     </a:solidFill>
@@ -11618,7 +11618,7 @@
               </a:ln>
               <a:extLst>
                 <a:ext uri="{91240B29-F687-4f45-9708-019B960494DF}">
-                  <a14:hiddenLine xmlns="" xmlns:a14="http://schemas.microsoft.com/office/drawing/2010/main" w="9525">
+                  <a14:hiddenLine xmlns:a14="http://schemas.microsoft.com/office/drawing/2010/main" xmlns="" w="9525">
                     <a:solidFill>
                       <a:srgbClr val="000000"/>
                     </a:solidFill>
@@ -11686,7 +11686,7 @@
               </a:ln>
               <a:extLst>
                 <a:ext uri="{91240B29-F687-4f45-9708-019B960494DF}">
-                  <a14:hiddenLine xmlns="" xmlns:a14="http://schemas.microsoft.com/office/drawing/2010/main" w="9525">
+                  <a14:hiddenLine xmlns:a14="http://schemas.microsoft.com/office/drawing/2010/main" xmlns="" w="9525">
                     <a:solidFill>
                       <a:srgbClr val="000000"/>
                     </a:solidFill>
@@ -11776,7 +11776,7 @@
               </a:ln>
               <a:extLst>
                 <a:ext uri="{91240B29-F687-4f45-9708-019B960494DF}">
-                  <a14:hiddenLine xmlns="" xmlns:a14="http://schemas.microsoft.com/office/drawing/2010/main" w="9525">
+                  <a14:hiddenLine xmlns:a14="http://schemas.microsoft.com/office/drawing/2010/main" xmlns="" w="9525">
                     <a:solidFill>
                       <a:srgbClr val="000000"/>
                     </a:solidFill>
@@ -11810,7 +11810,7 @@
               </a:ln>
               <a:extLst>
                 <a:ext uri="{91240B29-F687-4f45-9708-019B960494DF}">
-                  <a14:hiddenLine xmlns="" xmlns:a14="http://schemas.microsoft.com/office/drawing/2010/main" w="9525">
+                  <a14:hiddenLine xmlns:a14="http://schemas.microsoft.com/office/drawing/2010/main" xmlns="" w="9525">
                     <a:solidFill>
                       <a:srgbClr val="000000"/>
                     </a:solidFill>
@@ -15361,7 +15361,7 @@
             <a:pPr algn="ctr"/>
             <a:r>
               <a:rPr lang="en-US" dirty="0" smtClean="0"/>
-              <a:t>Handyman</a:t>
+              <a:t>worker</a:t>
             </a:r>
             <a:endParaRPr lang="en-US" dirty="0"/>
           </a:p>
@@ -24276,7 +24276,19 @@
               <a:rPr lang="en-US" dirty="0" smtClean="0">
                 <a:latin typeface="Bell MT" panose="02020503060305020303" pitchFamily="18" charset="0"/>
               </a:rPr>
-              <a:t>What is Handyman?</a:t>
+              <a:t>What is </a:t>
+            </a:r>
+            <a:r>
+              <a:rPr lang="en-US" dirty="0" err="1" smtClean="0">
+                <a:latin typeface="Bell MT" panose="02020503060305020303" pitchFamily="18" charset="0"/>
+              </a:rPr>
+              <a:t>verihandy</a:t>
+            </a:r>
+            <a:r>
+              <a:rPr lang="en-US" dirty="0" smtClean="0">
+                <a:latin typeface="Bell MT" panose="02020503060305020303" pitchFamily="18" charset="0"/>
+              </a:rPr>
+              <a:t>?</a:t>
             </a:r>
             <a:endParaRPr lang="en-US" dirty="0">
               <a:latin typeface="Bell MT" panose="02020503060305020303" pitchFamily="18" charset="0"/>
@@ -24321,7 +24333,6 @@
               <a:rPr lang="en-US" dirty="0" smtClean="0"/>
               <a:t>) with ease of use (such as Uber)</a:t>
             </a:r>
-            <a:endParaRPr lang="en-US" dirty="0" smtClean="0"/>
           </a:p>
           <a:p>
             <a:r>

</xml_diff>